<commit_message>
Saved in open office format
</commit_message>
<xml_diff>
--- a/Docs/Security PPT.pptx
+++ b/Docs/Security PPT.pptx
@@ -3,15 +3,16 @@
 <p:presentation xmlns:a="http://schemas.openxmlformats.org/drawingml/2006/main" xmlns:p="http://schemas.openxmlformats.org/presentationml/2006/main" xmlns:r="http://schemas.openxmlformats.org/officeDocument/2006/relationships" xmlns:p14="http://schemas.microsoft.com/office/powerpoint/2010/main" xmlns:p15="http://schemas.microsoft.com/office/powerpoint/2012/main" xmlns:mc="http://schemas.openxmlformats.org/markup-compatibility/2006">
   <p:sldMasterIdLst>
     <p:sldMasterId id="2147483648" r:id="rId2"/>
+    <p:sldMasterId id="2147483661" r:id="rId3"/>
   </p:sldMasterIdLst>
   <p:sldIdLst>
-    <p:sldId id="256" r:id="rId3"/>
-    <p:sldId id="257" r:id="rId4"/>
-    <p:sldId id="258" r:id="rId5"/>
-    <p:sldId id="259" r:id="rId6"/>
-    <p:sldId id="260" r:id="rId7"/>
-    <p:sldId id="261" r:id="rId8"/>
-    <p:sldId id="262" r:id="rId9"/>
+    <p:sldId id="256" r:id="rId4"/>
+    <p:sldId id="257" r:id="rId5"/>
+    <p:sldId id="258" r:id="rId6"/>
+    <p:sldId id="259" r:id="rId7"/>
+    <p:sldId id="260" r:id="rId8"/>
+    <p:sldId id="261" r:id="rId9"/>
+    <p:sldId id="262" r:id="rId10"/>
   </p:sldIdLst>
   <p:sldSz cx="10080625" cy="5670550"/>
   <p:notesSz cx="7559675" cy="10691812"/>
@@ -59,7 +60,7 @@
       </p:grpSpPr>
       <p:sp>
         <p:nvSpPr>
-          <p:cNvPr id="27" name="PlaceHolder 1"/>
+          <p:cNvPr id="24" name="PlaceHolder 1"/>
           <p:cNvSpPr>
             <a:spLocks noGrp="1"/>
           </p:cNvSpPr>
@@ -70,7 +71,7 @@
         <p:spPr>
           <a:xfrm>
             <a:off x="504000" y="216000"/>
-            <a:ext cx="7020000" cy="936000"/>
+            <a:ext cx="7019640" cy="935640"/>
           </a:xfrm>
           <a:prstGeom prst="rect">
             <a:avLst/>
@@ -79,18 +80,16 @@
         <p:txBody>
           <a:bodyPr lIns="0" rIns="0" tIns="0" bIns="0" anchor="ctr"/>
           <a:p>
-            <a:endParaRPr b="0" lang="en-IN" sz="3570" spc="-1" strike="noStrike">
-              <a:solidFill>
-                <a:srgbClr val="ffffff"/>
-              </a:solidFill>
-              <a:latin typeface="Arial"/>
-            </a:endParaRPr>
-          </a:p>
-        </p:txBody>
-      </p:sp>
-      <p:sp>
-        <p:nvSpPr>
-          <p:cNvPr id="28" name="PlaceHolder 2"/>
+            <a:pPr algn="ctr"/>
+            <a:endParaRPr b="0" lang="en-IN" sz="4400" spc="-1" strike="noStrike">
+              <a:latin typeface="Arial"/>
+            </a:endParaRPr>
+          </a:p>
+        </p:txBody>
+      </p:sp>
+      <p:sp>
+        <p:nvSpPr>
+          <p:cNvPr id="25" name="PlaceHolder 2"/>
           <p:cNvSpPr>
             <a:spLocks noGrp="1"/>
           </p:cNvSpPr>
@@ -101,26 +100,26 @@
         <p:spPr>
           <a:xfrm>
             <a:off x="504000" y="1368000"/>
-            <a:ext cx="9072000" cy="1568160"/>
-          </a:xfrm>
-          <a:prstGeom prst="rect">
-            <a:avLst/>
-          </a:prstGeom>
-        </p:spPr>
-        <p:txBody>
-          <a:bodyPr lIns="0" rIns="0" tIns="0" bIns="0">
-            <a:normAutofit/>
-          </a:bodyPr>
-          <a:p>
-            <a:endParaRPr b="0" lang="en-IN" sz="2600" spc="-1" strike="noStrike">
-              <a:latin typeface="Arial"/>
-            </a:endParaRPr>
-          </a:p>
-        </p:txBody>
-      </p:sp>
-      <p:sp>
-        <p:nvSpPr>
-          <p:cNvPr id="29" name="PlaceHolder 3"/>
+            <a:ext cx="9071640" cy="1568160"/>
+          </a:xfrm>
+          <a:prstGeom prst="rect">
+            <a:avLst/>
+          </a:prstGeom>
+        </p:spPr>
+        <p:txBody>
+          <a:bodyPr lIns="0" rIns="0" tIns="0" bIns="0">
+            <a:normAutofit/>
+          </a:bodyPr>
+          <a:p>
+            <a:endParaRPr b="0" lang="en-IN" sz="3200" spc="-1" strike="noStrike">
+              <a:latin typeface="Arial"/>
+            </a:endParaRPr>
+          </a:p>
+        </p:txBody>
+      </p:sp>
+      <p:sp>
+        <p:nvSpPr>
+          <p:cNvPr id="26" name="PlaceHolder 3"/>
           <p:cNvSpPr>
             <a:spLocks noGrp="1"/>
           </p:cNvSpPr>
@@ -131,18 +130,18 @@
         <p:spPr>
           <a:xfrm>
             <a:off x="504000" y="3085560"/>
-            <a:ext cx="9072000" cy="1568160"/>
-          </a:xfrm>
-          <a:prstGeom prst="rect">
-            <a:avLst/>
-          </a:prstGeom>
-        </p:spPr>
-        <p:txBody>
-          <a:bodyPr lIns="0" rIns="0" tIns="0" bIns="0">
-            <a:normAutofit/>
-          </a:bodyPr>
-          <a:p>
-            <a:endParaRPr b="0" lang="en-IN" sz="2600" spc="-1" strike="noStrike">
+            <a:ext cx="9071640" cy="1568160"/>
+          </a:xfrm>
+          <a:prstGeom prst="rect">
+            <a:avLst/>
+          </a:prstGeom>
+        </p:spPr>
+        <p:txBody>
+          <a:bodyPr lIns="0" rIns="0" tIns="0" bIns="0">
+            <a:normAutofit/>
+          </a:bodyPr>
+          <a:p>
+            <a:endParaRPr b="0" lang="en-IN" sz="3200" spc="-1" strike="noStrike">
               <a:latin typeface="Arial"/>
             </a:endParaRPr>
           </a:p>
@@ -172,7 +171,7 @@
       </p:grpSpPr>
       <p:sp>
         <p:nvSpPr>
-          <p:cNvPr id="30" name="PlaceHolder 1"/>
+          <p:cNvPr id="27" name="PlaceHolder 1"/>
           <p:cNvSpPr>
             <a:spLocks noGrp="1"/>
           </p:cNvSpPr>
@@ -183,7 +182,7 @@
         <p:spPr>
           <a:xfrm>
             <a:off x="504000" y="216000"/>
-            <a:ext cx="7020000" cy="936000"/>
+            <a:ext cx="7019640" cy="935640"/>
           </a:xfrm>
           <a:prstGeom prst="rect">
             <a:avLst/>
@@ -192,18 +191,16 @@
         <p:txBody>
           <a:bodyPr lIns="0" rIns="0" tIns="0" bIns="0" anchor="ctr"/>
           <a:p>
-            <a:endParaRPr b="0" lang="en-IN" sz="3570" spc="-1" strike="noStrike">
-              <a:solidFill>
-                <a:srgbClr val="ffffff"/>
-              </a:solidFill>
-              <a:latin typeface="Arial"/>
-            </a:endParaRPr>
-          </a:p>
-        </p:txBody>
-      </p:sp>
-      <p:sp>
-        <p:nvSpPr>
-          <p:cNvPr id="31" name="PlaceHolder 2"/>
+            <a:pPr algn="ctr"/>
+            <a:endParaRPr b="0" lang="en-IN" sz="4400" spc="-1" strike="noStrike">
+              <a:latin typeface="Arial"/>
+            </a:endParaRPr>
+          </a:p>
+        </p:txBody>
+      </p:sp>
+      <p:sp>
+        <p:nvSpPr>
+          <p:cNvPr id="28" name="PlaceHolder 2"/>
           <p:cNvSpPr>
             <a:spLocks noGrp="1"/>
           </p:cNvSpPr>
@@ -225,15 +222,15 @@
             <a:normAutofit/>
           </a:bodyPr>
           <a:p>
-            <a:endParaRPr b="0" lang="en-IN" sz="2600" spc="-1" strike="noStrike">
-              <a:latin typeface="Arial"/>
-            </a:endParaRPr>
-          </a:p>
-        </p:txBody>
-      </p:sp>
-      <p:sp>
-        <p:nvSpPr>
-          <p:cNvPr id="32" name="PlaceHolder 3"/>
+            <a:endParaRPr b="0" lang="en-IN" sz="3200" spc="-1" strike="noStrike">
+              <a:latin typeface="Arial"/>
+            </a:endParaRPr>
+          </a:p>
+        </p:txBody>
+      </p:sp>
+      <p:sp>
+        <p:nvSpPr>
+          <p:cNvPr id="29" name="PlaceHolder 3"/>
           <p:cNvSpPr>
             <a:spLocks noGrp="1"/>
           </p:cNvSpPr>
@@ -255,15 +252,15 @@
             <a:normAutofit/>
           </a:bodyPr>
           <a:p>
-            <a:endParaRPr b="0" lang="en-IN" sz="2600" spc="-1" strike="noStrike">
-              <a:latin typeface="Arial"/>
-            </a:endParaRPr>
-          </a:p>
-        </p:txBody>
-      </p:sp>
-      <p:sp>
-        <p:nvSpPr>
-          <p:cNvPr id="33" name="PlaceHolder 4"/>
+            <a:endParaRPr b="0" lang="en-IN" sz="3200" spc="-1" strike="noStrike">
+              <a:latin typeface="Arial"/>
+            </a:endParaRPr>
+          </a:p>
+        </p:txBody>
+      </p:sp>
+      <p:sp>
+        <p:nvSpPr>
+          <p:cNvPr id="30" name="PlaceHolder 4"/>
           <p:cNvSpPr>
             <a:spLocks noGrp="1"/>
           </p:cNvSpPr>
@@ -285,15 +282,15 @@
             <a:normAutofit/>
           </a:bodyPr>
           <a:p>
-            <a:endParaRPr b="0" lang="en-IN" sz="2600" spc="-1" strike="noStrike">
-              <a:latin typeface="Arial"/>
-            </a:endParaRPr>
-          </a:p>
-        </p:txBody>
-      </p:sp>
-      <p:sp>
-        <p:nvSpPr>
-          <p:cNvPr id="34" name="PlaceHolder 5"/>
+            <a:endParaRPr b="0" lang="en-IN" sz="3200" spc="-1" strike="noStrike">
+              <a:latin typeface="Arial"/>
+            </a:endParaRPr>
+          </a:p>
+        </p:txBody>
+      </p:sp>
+      <p:sp>
+        <p:nvSpPr>
+          <p:cNvPr id="31" name="PlaceHolder 5"/>
           <p:cNvSpPr>
             <a:spLocks noGrp="1"/>
           </p:cNvSpPr>
@@ -315,7 +312,7 @@
             <a:normAutofit/>
           </a:bodyPr>
           <a:p>
-            <a:endParaRPr b="0" lang="en-IN" sz="2600" spc="-1" strike="noStrike">
+            <a:endParaRPr b="0" lang="en-IN" sz="3200" spc="-1" strike="noStrike">
               <a:latin typeface="Arial"/>
             </a:endParaRPr>
           </a:p>
@@ -345,7 +342,7 @@
       </p:grpSpPr>
       <p:sp>
         <p:nvSpPr>
-          <p:cNvPr id="35" name="PlaceHolder 1"/>
+          <p:cNvPr id="32" name="PlaceHolder 1"/>
           <p:cNvSpPr>
             <a:spLocks noGrp="1"/>
           </p:cNvSpPr>
@@ -356,7 +353,7 @@
         <p:spPr>
           <a:xfrm>
             <a:off x="504000" y="216000"/>
-            <a:ext cx="7020000" cy="936000"/>
+            <a:ext cx="7019640" cy="935640"/>
           </a:xfrm>
           <a:prstGeom prst="rect">
             <a:avLst/>
@@ -365,18 +362,16 @@
         <p:txBody>
           <a:bodyPr lIns="0" rIns="0" tIns="0" bIns="0" anchor="ctr"/>
           <a:p>
-            <a:endParaRPr b="0" lang="en-IN" sz="3570" spc="-1" strike="noStrike">
-              <a:solidFill>
-                <a:srgbClr val="ffffff"/>
-              </a:solidFill>
-              <a:latin typeface="Arial"/>
-            </a:endParaRPr>
-          </a:p>
-        </p:txBody>
-      </p:sp>
-      <p:sp>
-        <p:nvSpPr>
-          <p:cNvPr id="36" name="PlaceHolder 2"/>
+            <a:pPr algn="ctr"/>
+            <a:endParaRPr b="0" lang="en-IN" sz="4400" spc="-1" strike="noStrike">
+              <a:latin typeface="Arial"/>
+            </a:endParaRPr>
+          </a:p>
+        </p:txBody>
+      </p:sp>
+      <p:sp>
+        <p:nvSpPr>
+          <p:cNvPr id="33" name="PlaceHolder 2"/>
           <p:cNvSpPr>
             <a:spLocks noGrp="1"/>
           </p:cNvSpPr>
@@ -387,26 +382,26 @@
         <p:spPr>
           <a:xfrm>
             <a:off x="504000" y="1368000"/>
-            <a:ext cx="2921040" cy="1568160"/>
-          </a:xfrm>
-          <a:prstGeom prst="rect">
-            <a:avLst/>
-          </a:prstGeom>
-        </p:spPr>
-        <p:txBody>
-          <a:bodyPr lIns="0" rIns="0" tIns="0" bIns="0">
-            <a:normAutofit/>
-          </a:bodyPr>
-          <a:p>
-            <a:endParaRPr b="0" lang="en-IN" sz="2600" spc="-1" strike="noStrike">
-              <a:latin typeface="Arial"/>
-            </a:endParaRPr>
-          </a:p>
-        </p:txBody>
-      </p:sp>
-      <p:sp>
-        <p:nvSpPr>
-          <p:cNvPr id="37" name="PlaceHolder 3"/>
+            <a:ext cx="2920680" cy="1568160"/>
+          </a:xfrm>
+          <a:prstGeom prst="rect">
+            <a:avLst/>
+          </a:prstGeom>
+        </p:spPr>
+        <p:txBody>
+          <a:bodyPr lIns="0" rIns="0" tIns="0" bIns="0">
+            <a:normAutofit/>
+          </a:bodyPr>
+          <a:p>
+            <a:endParaRPr b="0" lang="en-IN" sz="3200" spc="-1" strike="noStrike">
+              <a:latin typeface="Arial"/>
+            </a:endParaRPr>
+          </a:p>
+        </p:txBody>
+      </p:sp>
+      <p:sp>
+        <p:nvSpPr>
+          <p:cNvPr id="34" name="PlaceHolder 3"/>
           <p:cNvSpPr>
             <a:spLocks noGrp="1"/>
           </p:cNvSpPr>
@@ -416,27 +411,27 @@
         </p:nvSpPr>
         <p:spPr>
           <a:xfrm>
-            <a:off x="3571560" y="1368000"/>
-            <a:ext cx="2921040" cy="1568160"/>
-          </a:xfrm>
-          <a:prstGeom prst="rect">
-            <a:avLst/>
-          </a:prstGeom>
-        </p:spPr>
-        <p:txBody>
-          <a:bodyPr lIns="0" rIns="0" tIns="0" bIns="0">
-            <a:normAutofit/>
-          </a:bodyPr>
-          <a:p>
-            <a:endParaRPr b="0" lang="en-IN" sz="2600" spc="-1" strike="noStrike">
-              <a:latin typeface="Arial"/>
-            </a:endParaRPr>
-          </a:p>
-        </p:txBody>
-      </p:sp>
-      <p:sp>
-        <p:nvSpPr>
-          <p:cNvPr id="38" name="PlaceHolder 4"/>
+            <a:off x="3571200" y="1368000"/>
+            <a:ext cx="2920680" cy="1568160"/>
+          </a:xfrm>
+          <a:prstGeom prst="rect">
+            <a:avLst/>
+          </a:prstGeom>
+        </p:spPr>
+        <p:txBody>
+          <a:bodyPr lIns="0" rIns="0" tIns="0" bIns="0">
+            <a:normAutofit/>
+          </a:bodyPr>
+          <a:p>
+            <a:endParaRPr b="0" lang="en-IN" sz="3200" spc="-1" strike="noStrike">
+              <a:latin typeface="Arial"/>
+            </a:endParaRPr>
+          </a:p>
+        </p:txBody>
+      </p:sp>
+      <p:sp>
+        <p:nvSpPr>
+          <p:cNvPr id="35" name="PlaceHolder 4"/>
           <p:cNvSpPr>
             <a:spLocks noGrp="1"/>
           </p:cNvSpPr>
@@ -446,27 +441,27 @@
         </p:nvSpPr>
         <p:spPr>
           <a:xfrm>
-            <a:off x="6639120" y="1368000"/>
-            <a:ext cx="2921040" cy="1568160"/>
-          </a:xfrm>
-          <a:prstGeom prst="rect">
-            <a:avLst/>
-          </a:prstGeom>
-        </p:spPr>
-        <p:txBody>
-          <a:bodyPr lIns="0" rIns="0" tIns="0" bIns="0">
-            <a:normAutofit/>
-          </a:bodyPr>
-          <a:p>
-            <a:endParaRPr b="0" lang="en-IN" sz="2600" spc="-1" strike="noStrike">
-              <a:latin typeface="Arial"/>
-            </a:endParaRPr>
-          </a:p>
-        </p:txBody>
-      </p:sp>
-      <p:sp>
-        <p:nvSpPr>
-          <p:cNvPr id="39" name="PlaceHolder 5"/>
+            <a:off x="6638040" y="1368000"/>
+            <a:ext cx="2920680" cy="1568160"/>
+          </a:xfrm>
+          <a:prstGeom prst="rect">
+            <a:avLst/>
+          </a:prstGeom>
+        </p:spPr>
+        <p:txBody>
+          <a:bodyPr lIns="0" rIns="0" tIns="0" bIns="0">
+            <a:normAutofit/>
+          </a:bodyPr>
+          <a:p>
+            <a:endParaRPr b="0" lang="en-IN" sz="3200" spc="-1" strike="noStrike">
+              <a:latin typeface="Arial"/>
+            </a:endParaRPr>
+          </a:p>
+        </p:txBody>
+      </p:sp>
+      <p:sp>
+        <p:nvSpPr>
+          <p:cNvPr id="36" name="PlaceHolder 5"/>
           <p:cNvSpPr>
             <a:spLocks noGrp="1"/>
           </p:cNvSpPr>
@@ -477,26 +472,26 @@
         <p:spPr>
           <a:xfrm>
             <a:off x="504000" y="3085560"/>
-            <a:ext cx="2921040" cy="1568160"/>
-          </a:xfrm>
-          <a:prstGeom prst="rect">
-            <a:avLst/>
-          </a:prstGeom>
-        </p:spPr>
-        <p:txBody>
-          <a:bodyPr lIns="0" rIns="0" tIns="0" bIns="0">
-            <a:normAutofit/>
-          </a:bodyPr>
-          <a:p>
-            <a:endParaRPr b="0" lang="en-IN" sz="2600" spc="-1" strike="noStrike">
-              <a:latin typeface="Arial"/>
-            </a:endParaRPr>
-          </a:p>
-        </p:txBody>
-      </p:sp>
-      <p:sp>
-        <p:nvSpPr>
-          <p:cNvPr id="40" name="PlaceHolder 6"/>
+            <a:ext cx="2920680" cy="1568160"/>
+          </a:xfrm>
+          <a:prstGeom prst="rect">
+            <a:avLst/>
+          </a:prstGeom>
+        </p:spPr>
+        <p:txBody>
+          <a:bodyPr lIns="0" rIns="0" tIns="0" bIns="0">
+            <a:normAutofit/>
+          </a:bodyPr>
+          <a:p>
+            <a:endParaRPr b="0" lang="en-IN" sz="3200" spc="-1" strike="noStrike">
+              <a:latin typeface="Arial"/>
+            </a:endParaRPr>
+          </a:p>
+        </p:txBody>
+      </p:sp>
+      <p:sp>
+        <p:nvSpPr>
+          <p:cNvPr id="37" name="PlaceHolder 6"/>
           <p:cNvSpPr>
             <a:spLocks noGrp="1"/>
           </p:cNvSpPr>
@@ -506,27 +501,27 @@
         </p:nvSpPr>
         <p:spPr>
           <a:xfrm>
-            <a:off x="3571560" y="3085560"/>
-            <a:ext cx="2921040" cy="1568160"/>
-          </a:xfrm>
-          <a:prstGeom prst="rect">
-            <a:avLst/>
-          </a:prstGeom>
-        </p:spPr>
-        <p:txBody>
-          <a:bodyPr lIns="0" rIns="0" tIns="0" bIns="0">
-            <a:normAutofit/>
-          </a:bodyPr>
-          <a:p>
-            <a:endParaRPr b="0" lang="en-IN" sz="2600" spc="-1" strike="noStrike">
-              <a:latin typeface="Arial"/>
-            </a:endParaRPr>
-          </a:p>
-        </p:txBody>
-      </p:sp>
-      <p:sp>
-        <p:nvSpPr>
-          <p:cNvPr id="41" name="PlaceHolder 7"/>
+            <a:off x="3571200" y="3085560"/>
+            <a:ext cx="2920680" cy="1568160"/>
+          </a:xfrm>
+          <a:prstGeom prst="rect">
+            <a:avLst/>
+          </a:prstGeom>
+        </p:spPr>
+        <p:txBody>
+          <a:bodyPr lIns="0" rIns="0" tIns="0" bIns="0">
+            <a:normAutofit/>
+          </a:bodyPr>
+          <a:p>
+            <a:endParaRPr b="0" lang="en-IN" sz="3200" spc="-1" strike="noStrike">
+              <a:latin typeface="Arial"/>
+            </a:endParaRPr>
+          </a:p>
+        </p:txBody>
+      </p:sp>
+      <p:sp>
+        <p:nvSpPr>
+          <p:cNvPr id="38" name="PlaceHolder 7"/>
           <p:cNvSpPr>
             <a:spLocks noGrp="1"/>
           </p:cNvSpPr>
@@ -536,19 +531,556 @@
         </p:nvSpPr>
         <p:spPr>
           <a:xfrm>
-            <a:off x="6639120" y="3085560"/>
-            <a:ext cx="2921040" cy="1568160"/>
-          </a:xfrm>
-          <a:prstGeom prst="rect">
-            <a:avLst/>
-          </a:prstGeom>
-        </p:spPr>
-        <p:txBody>
-          <a:bodyPr lIns="0" rIns="0" tIns="0" bIns="0">
-            <a:normAutofit/>
-          </a:bodyPr>
-          <a:p>
-            <a:endParaRPr b="0" lang="en-IN" sz="2600" spc="-1" strike="noStrike">
+            <a:off x="6638040" y="3085560"/>
+            <a:ext cx="2920680" cy="1568160"/>
+          </a:xfrm>
+          <a:prstGeom prst="rect">
+            <a:avLst/>
+          </a:prstGeom>
+        </p:spPr>
+        <p:txBody>
+          <a:bodyPr lIns="0" rIns="0" tIns="0" bIns="0">
+            <a:normAutofit/>
+          </a:bodyPr>
+          <a:p>
+            <a:endParaRPr b="0" lang="en-IN" sz="3200" spc="-1" strike="noStrike">
+              <a:latin typeface="Arial"/>
+            </a:endParaRPr>
+          </a:p>
+        </p:txBody>
+      </p:sp>
+    </p:spTree>
+  </p:cSld>
+</p:sldLayout>
+</file>
+
+<file path=ppt/slideLayouts/slideLayout13.xml><?xml version="1.0" encoding="utf-8"?>
+<p:sldLayout xmlns:a="http://schemas.openxmlformats.org/drawingml/2006/main" xmlns:p="http://schemas.openxmlformats.org/presentationml/2006/main" xmlns:r="http://schemas.openxmlformats.org/officeDocument/2006/relationships" xmlns:p14="http://schemas.microsoft.com/office/powerpoint/2010/main" xmlns:p15="http://schemas.microsoft.com/office/powerpoint/2012/main" xmlns:mc="http://schemas.openxmlformats.org/markup-compatibility/2006" type="blank" preserve="1">
+  <p:cSld name="Blank Slide">
+    <p:spTree>
+      <p:nvGrpSpPr>
+        <p:cNvPr id="1" name=""/>
+        <p:cNvGrpSpPr/>
+        <p:nvPr/>
+      </p:nvGrpSpPr>
+      <p:grpSpPr>
+        <a:xfrm>
+          <a:off x="0" y="0"/>
+          <a:ext cx="0" cy="0"/>
+          <a:chOff x="0" y="0"/>
+          <a:chExt cx="0" cy="0"/>
+        </a:xfrm>
+      </p:grpSpPr>
+    </p:spTree>
+  </p:cSld>
+</p:sldLayout>
+</file>
+
+<file path=ppt/slideLayouts/slideLayout14.xml><?xml version="1.0" encoding="utf-8"?>
+<p:sldLayout xmlns:a="http://schemas.openxmlformats.org/drawingml/2006/main" xmlns:p="http://schemas.openxmlformats.org/presentationml/2006/main" xmlns:r="http://schemas.openxmlformats.org/officeDocument/2006/relationships" xmlns:p14="http://schemas.microsoft.com/office/powerpoint/2010/main" xmlns:p15="http://schemas.microsoft.com/office/powerpoint/2012/main" xmlns:mc="http://schemas.openxmlformats.org/markup-compatibility/2006" type="tx" preserve="1">
+  <p:cSld name="Title Slide">
+    <p:spTree>
+      <p:nvGrpSpPr>
+        <p:cNvPr id="1" name=""/>
+        <p:cNvGrpSpPr/>
+        <p:nvPr/>
+      </p:nvGrpSpPr>
+      <p:grpSpPr>
+        <a:xfrm>
+          <a:off x="0" y="0"/>
+          <a:ext cx="0" cy="0"/>
+          <a:chOff x="0" y="0"/>
+          <a:chExt cx="0" cy="0"/>
+        </a:xfrm>
+      </p:grpSpPr>
+      <p:sp>
+        <p:nvSpPr>
+          <p:cNvPr id="42" name="PlaceHolder 1"/>
+          <p:cNvSpPr>
+            <a:spLocks noGrp="1"/>
+          </p:cNvSpPr>
+          <p:nvPr>
+            <p:ph type="title"/>
+          </p:nvPr>
+        </p:nvSpPr>
+        <p:spPr>
+          <a:xfrm>
+            <a:off x="504000" y="216000"/>
+            <a:ext cx="7019640" cy="935640"/>
+          </a:xfrm>
+          <a:prstGeom prst="rect">
+            <a:avLst/>
+          </a:prstGeom>
+        </p:spPr>
+        <p:txBody>
+          <a:bodyPr lIns="0" rIns="0" tIns="0" bIns="0" anchor="ctr"/>
+          <a:p>
+            <a:pPr algn="ctr"/>
+            <a:endParaRPr b="0" lang="en-IN" sz="4400" spc="-1" strike="noStrike">
+              <a:latin typeface="Arial"/>
+            </a:endParaRPr>
+          </a:p>
+        </p:txBody>
+      </p:sp>
+      <p:sp>
+        <p:nvSpPr>
+          <p:cNvPr id="43" name="PlaceHolder 2"/>
+          <p:cNvSpPr>
+            <a:spLocks noGrp="1"/>
+          </p:cNvSpPr>
+          <p:nvPr>
+            <p:ph type="subTitle"/>
+          </p:nvPr>
+        </p:nvSpPr>
+        <p:spPr>
+          <a:xfrm>
+            <a:off x="504000" y="1368000"/>
+            <a:ext cx="9071640" cy="3287880"/>
+          </a:xfrm>
+          <a:prstGeom prst="rect">
+            <a:avLst/>
+          </a:prstGeom>
+        </p:spPr>
+        <p:txBody>
+          <a:bodyPr lIns="0" rIns="0" tIns="0" bIns="0" anchor="ctr"/>
+          <a:p>
+            <a:pPr algn="ctr"/>
+            <a:endParaRPr b="0" lang="en-IN" sz="3200" spc="-1" strike="noStrike">
+              <a:latin typeface="Arial"/>
+            </a:endParaRPr>
+          </a:p>
+        </p:txBody>
+      </p:sp>
+    </p:spTree>
+  </p:cSld>
+</p:sldLayout>
+</file>
+
+<file path=ppt/slideLayouts/slideLayout15.xml><?xml version="1.0" encoding="utf-8"?>
+<p:sldLayout xmlns:a="http://schemas.openxmlformats.org/drawingml/2006/main" xmlns:p="http://schemas.openxmlformats.org/presentationml/2006/main" xmlns:r="http://schemas.openxmlformats.org/officeDocument/2006/relationships" xmlns:p14="http://schemas.microsoft.com/office/powerpoint/2010/main" xmlns:p15="http://schemas.microsoft.com/office/powerpoint/2012/main" xmlns:mc="http://schemas.openxmlformats.org/markup-compatibility/2006" type="obj" preserve="1">
+  <p:cSld name="Title, Content">
+    <p:spTree>
+      <p:nvGrpSpPr>
+        <p:cNvPr id="1" name=""/>
+        <p:cNvGrpSpPr/>
+        <p:nvPr/>
+      </p:nvGrpSpPr>
+      <p:grpSpPr>
+        <a:xfrm>
+          <a:off x="0" y="0"/>
+          <a:ext cx="0" cy="0"/>
+          <a:chOff x="0" y="0"/>
+          <a:chExt cx="0" cy="0"/>
+        </a:xfrm>
+      </p:grpSpPr>
+      <p:sp>
+        <p:nvSpPr>
+          <p:cNvPr id="44" name="PlaceHolder 1"/>
+          <p:cNvSpPr>
+            <a:spLocks noGrp="1"/>
+          </p:cNvSpPr>
+          <p:nvPr>
+            <p:ph type="title"/>
+          </p:nvPr>
+        </p:nvSpPr>
+        <p:spPr>
+          <a:xfrm>
+            <a:off x="504000" y="216000"/>
+            <a:ext cx="7019640" cy="935640"/>
+          </a:xfrm>
+          <a:prstGeom prst="rect">
+            <a:avLst/>
+          </a:prstGeom>
+        </p:spPr>
+        <p:txBody>
+          <a:bodyPr lIns="0" rIns="0" tIns="0" bIns="0" anchor="ctr"/>
+          <a:p>
+            <a:pPr algn="ctr"/>
+            <a:endParaRPr b="0" lang="en-IN" sz="4400" spc="-1" strike="noStrike">
+              <a:latin typeface="Arial"/>
+            </a:endParaRPr>
+          </a:p>
+        </p:txBody>
+      </p:sp>
+      <p:sp>
+        <p:nvSpPr>
+          <p:cNvPr id="45" name="PlaceHolder 2"/>
+          <p:cNvSpPr>
+            <a:spLocks noGrp="1"/>
+          </p:cNvSpPr>
+          <p:nvPr>
+            <p:ph type="body"/>
+          </p:nvPr>
+        </p:nvSpPr>
+        <p:spPr>
+          <a:xfrm>
+            <a:off x="504000" y="1368000"/>
+            <a:ext cx="9071640" cy="3287880"/>
+          </a:xfrm>
+          <a:prstGeom prst="rect">
+            <a:avLst/>
+          </a:prstGeom>
+        </p:spPr>
+        <p:txBody>
+          <a:bodyPr lIns="0" rIns="0" tIns="0" bIns="0">
+            <a:normAutofit/>
+          </a:bodyPr>
+          <a:p>
+            <a:endParaRPr b="0" lang="en-IN" sz="3200" spc="-1" strike="noStrike">
+              <a:latin typeface="Arial"/>
+            </a:endParaRPr>
+          </a:p>
+        </p:txBody>
+      </p:sp>
+    </p:spTree>
+  </p:cSld>
+</p:sldLayout>
+</file>
+
+<file path=ppt/slideLayouts/slideLayout16.xml><?xml version="1.0" encoding="utf-8"?>
+<p:sldLayout xmlns:a="http://schemas.openxmlformats.org/drawingml/2006/main" xmlns:p="http://schemas.openxmlformats.org/presentationml/2006/main" xmlns:r="http://schemas.openxmlformats.org/officeDocument/2006/relationships" xmlns:p14="http://schemas.microsoft.com/office/powerpoint/2010/main" xmlns:p15="http://schemas.microsoft.com/office/powerpoint/2012/main" xmlns:mc="http://schemas.openxmlformats.org/markup-compatibility/2006" type="twoObj" preserve="1">
+  <p:cSld name="Title, 2 Content">
+    <p:spTree>
+      <p:nvGrpSpPr>
+        <p:cNvPr id="1" name=""/>
+        <p:cNvGrpSpPr/>
+        <p:nvPr/>
+      </p:nvGrpSpPr>
+      <p:grpSpPr>
+        <a:xfrm>
+          <a:off x="0" y="0"/>
+          <a:ext cx="0" cy="0"/>
+          <a:chOff x="0" y="0"/>
+          <a:chExt cx="0" cy="0"/>
+        </a:xfrm>
+      </p:grpSpPr>
+      <p:sp>
+        <p:nvSpPr>
+          <p:cNvPr id="46" name="PlaceHolder 1"/>
+          <p:cNvSpPr>
+            <a:spLocks noGrp="1"/>
+          </p:cNvSpPr>
+          <p:nvPr>
+            <p:ph type="title"/>
+          </p:nvPr>
+        </p:nvSpPr>
+        <p:spPr>
+          <a:xfrm>
+            <a:off x="504000" y="216000"/>
+            <a:ext cx="7019640" cy="935640"/>
+          </a:xfrm>
+          <a:prstGeom prst="rect">
+            <a:avLst/>
+          </a:prstGeom>
+        </p:spPr>
+        <p:txBody>
+          <a:bodyPr lIns="0" rIns="0" tIns="0" bIns="0" anchor="ctr"/>
+          <a:p>
+            <a:pPr algn="ctr"/>
+            <a:endParaRPr b="0" lang="en-IN" sz="4400" spc="-1" strike="noStrike">
+              <a:latin typeface="Arial"/>
+            </a:endParaRPr>
+          </a:p>
+        </p:txBody>
+      </p:sp>
+      <p:sp>
+        <p:nvSpPr>
+          <p:cNvPr id="47" name="PlaceHolder 2"/>
+          <p:cNvSpPr>
+            <a:spLocks noGrp="1"/>
+          </p:cNvSpPr>
+          <p:nvPr>
+            <p:ph type="body"/>
+          </p:nvPr>
+        </p:nvSpPr>
+        <p:spPr>
+          <a:xfrm>
+            <a:off x="504000" y="1368000"/>
+            <a:ext cx="4426920" cy="3287880"/>
+          </a:xfrm>
+          <a:prstGeom prst="rect">
+            <a:avLst/>
+          </a:prstGeom>
+        </p:spPr>
+        <p:txBody>
+          <a:bodyPr lIns="0" rIns="0" tIns="0" bIns="0">
+            <a:normAutofit/>
+          </a:bodyPr>
+          <a:p>
+            <a:endParaRPr b="0" lang="en-IN" sz="3200" spc="-1" strike="noStrike">
+              <a:latin typeface="Arial"/>
+            </a:endParaRPr>
+          </a:p>
+        </p:txBody>
+      </p:sp>
+      <p:sp>
+        <p:nvSpPr>
+          <p:cNvPr id="48" name="PlaceHolder 3"/>
+          <p:cNvSpPr>
+            <a:spLocks noGrp="1"/>
+          </p:cNvSpPr>
+          <p:nvPr>
+            <p:ph type="body"/>
+          </p:nvPr>
+        </p:nvSpPr>
+        <p:spPr>
+          <a:xfrm>
+            <a:off x="5152680" y="1368000"/>
+            <a:ext cx="4426920" cy="3287880"/>
+          </a:xfrm>
+          <a:prstGeom prst="rect">
+            <a:avLst/>
+          </a:prstGeom>
+        </p:spPr>
+        <p:txBody>
+          <a:bodyPr lIns="0" rIns="0" tIns="0" bIns="0">
+            <a:normAutofit/>
+          </a:bodyPr>
+          <a:p>
+            <a:endParaRPr b="0" lang="en-IN" sz="3200" spc="-1" strike="noStrike">
+              <a:latin typeface="Arial"/>
+            </a:endParaRPr>
+          </a:p>
+        </p:txBody>
+      </p:sp>
+    </p:spTree>
+  </p:cSld>
+</p:sldLayout>
+</file>
+
+<file path=ppt/slideLayouts/slideLayout17.xml><?xml version="1.0" encoding="utf-8"?>
+<p:sldLayout xmlns:a="http://schemas.openxmlformats.org/drawingml/2006/main" xmlns:p="http://schemas.openxmlformats.org/presentationml/2006/main" xmlns:r="http://schemas.openxmlformats.org/officeDocument/2006/relationships" xmlns:p14="http://schemas.microsoft.com/office/powerpoint/2010/main" xmlns:p15="http://schemas.microsoft.com/office/powerpoint/2012/main" xmlns:mc="http://schemas.openxmlformats.org/markup-compatibility/2006" type="titleOnly" preserve="1">
+  <p:cSld name="Title Only">
+    <p:spTree>
+      <p:nvGrpSpPr>
+        <p:cNvPr id="1" name=""/>
+        <p:cNvGrpSpPr/>
+        <p:nvPr/>
+      </p:nvGrpSpPr>
+      <p:grpSpPr>
+        <a:xfrm>
+          <a:off x="0" y="0"/>
+          <a:ext cx="0" cy="0"/>
+          <a:chOff x="0" y="0"/>
+          <a:chExt cx="0" cy="0"/>
+        </a:xfrm>
+      </p:grpSpPr>
+      <p:sp>
+        <p:nvSpPr>
+          <p:cNvPr id="49" name="PlaceHolder 1"/>
+          <p:cNvSpPr>
+            <a:spLocks noGrp="1"/>
+          </p:cNvSpPr>
+          <p:nvPr>
+            <p:ph type="title"/>
+          </p:nvPr>
+        </p:nvSpPr>
+        <p:spPr>
+          <a:xfrm>
+            <a:off x="504000" y="216000"/>
+            <a:ext cx="7019640" cy="935640"/>
+          </a:xfrm>
+          <a:prstGeom prst="rect">
+            <a:avLst/>
+          </a:prstGeom>
+        </p:spPr>
+        <p:txBody>
+          <a:bodyPr lIns="0" rIns="0" tIns="0" bIns="0" anchor="ctr"/>
+          <a:p>
+            <a:pPr algn="ctr"/>
+            <a:endParaRPr b="0" lang="en-IN" sz="4400" spc="-1" strike="noStrike">
+              <a:latin typeface="Arial"/>
+            </a:endParaRPr>
+          </a:p>
+        </p:txBody>
+      </p:sp>
+    </p:spTree>
+  </p:cSld>
+</p:sldLayout>
+</file>
+
+<file path=ppt/slideLayouts/slideLayout18.xml><?xml version="1.0" encoding="utf-8"?>
+<p:sldLayout xmlns:a="http://schemas.openxmlformats.org/drawingml/2006/main" xmlns:p="http://schemas.openxmlformats.org/presentationml/2006/main" xmlns:r="http://schemas.openxmlformats.org/officeDocument/2006/relationships" xmlns:p14="http://schemas.microsoft.com/office/powerpoint/2010/main" xmlns:p15="http://schemas.microsoft.com/office/powerpoint/2012/main" xmlns:mc="http://schemas.openxmlformats.org/markup-compatibility/2006" type="objOnly" preserve="1">
+  <p:cSld name="Centered Text">
+    <p:spTree>
+      <p:nvGrpSpPr>
+        <p:cNvPr id="1" name=""/>
+        <p:cNvGrpSpPr/>
+        <p:nvPr/>
+      </p:nvGrpSpPr>
+      <p:grpSpPr>
+        <a:xfrm>
+          <a:off x="0" y="0"/>
+          <a:ext cx="0" cy="0"/>
+          <a:chOff x="0" y="0"/>
+          <a:chExt cx="0" cy="0"/>
+        </a:xfrm>
+      </p:grpSpPr>
+      <p:sp>
+        <p:nvSpPr>
+          <p:cNvPr id="50" name="PlaceHolder 1"/>
+          <p:cNvSpPr>
+            <a:spLocks noGrp="1"/>
+          </p:cNvSpPr>
+          <p:nvPr>
+            <p:ph type="subTitle"/>
+          </p:nvPr>
+        </p:nvSpPr>
+        <p:spPr>
+          <a:xfrm>
+            <a:off x="504000" y="216000"/>
+            <a:ext cx="7019640" cy="4338360"/>
+          </a:xfrm>
+          <a:prstGeom prst="rect">
+            <a:avLst/>
+          </a:prstGeom>
+        </p:spPr>
+        <p:txBody>
+          <a:bodyPr lIns="0" rIns="0" tIns="0" bIns="0" anchor="ctr"/>
+          <a:p>
+            <a:pPr algn="ctr"/>
+            <a:endParaRPr b="0" lang="en-IN" sz="3200" spc="-1" strike="noStrike">
+              <a:latin typeface="Arial"/>
+            </a:endParaRPr>
+          </a:p>
+        </p:txBody>
+      </p:sp>
+    </p:spTree>
+  </p:cSld>
+</p:sldLayout>
+</file>
+
+<file path=ppt/slideLayouts/slideLayout19.xml><?xml version="1.0" encoding="utf-8"?>
+<p:sldLayout xmlns:a="http://schemas.openxmlformats.org/drawingml/2006/main" xmlns:p="http://schemas.openxmlformats.org/presentationml/2006/main" xmlns:r="http://schemas.openxmlformats.org/officeDocument/2006/relationships" xmlns:p14="http://schemas.microsoft.com/office/powerpoint/2010/main" xmlns:p15="http://schemas.microsoft.com/office/powerpoint/2012/main" xmlns:mc="http://schemas.openxmlformats.org/markup-compatibility/2006" type="twoObjAndObj" preserve="1">
+  <p:cSld name="Title, 2 Content and Content">
+    <p:spTree>
+      <p:nvGrpSpPr>
+        <p:cNvPr id="1" name=""/>
+        <p:cNvGrpSpPr/>
+        <p:nvPr/>
+      </p:nvGrpSpPr>
+      <p:grpSpPr>
+        <a:xfrm>
+          <a:off x="0" y="0"/>
+          <a:ext cx="0" cy="0"/>
+          <a:chOff x="0" y="0"/>
+          <a:chExt cx="0" cy="0"/>
+        </a:xfrm>
+      </p:grpSpPr>
+      <p:sp>
+        <p:nvSpPr>
+          <p:cNvPr id="51" name="PlaceHolder 1"/>
+          <p:cNvSpPr>
+            <a:spLocks noGrp="1"/>
+          </p:cNvSpPr>
+          <p:nvPr>
+            <p:ph type="title"/>
+          </p:nvPr>
+        </p:nvSpPr>
+        <p:spPr>
+          <a:xfrm>
+            <a:off x="504000" y="216000"/>
+            <a:ext cx="7019640" cy="935640"/>
+          </a:xfrm>
+          <a:prstGeom prst="rect">
+            <a:avLst/>
+          </a:prstGeom>
+        </p:spPr>
+        <p:txBody>
+          <a:bodyPr lIns="0" rIns="0" tIns="0" bIns="0" anchor="ctr"/>
+          <a:p>
+            <a:pPr algn="ctr"/>
+            <a:endParaRPr b="0" lang="en-IN" sz="4400" spc="-1" strike="noStrike">
+              <a:latin typeface="Arial"/>
+            </a:endParaRPr>
+          </a:p>
+        </p:txBody>
+      </p:sp>
+      <p:sp>
+        <p:nvSpPr>
+          <p:cNvPr id="52" name="PlaceHolder 2"/>
+          <p:cNvSpPr>
+            <a:spLocks noGrp="1"/>
+          </p:cNvSpPr>
+          <p:nvPr>
+            <p:ph type="body"/>
+          </p:nvPr>
+        </p:nvSpPr>
+        <p:spPr>
+          <a:xfrm>
+            <a:off x="504000" y="1368000"/>
+            <a:ext cx="4426920" cy="1568160"/>
+          </a:xfrm>
+          <a:prstGeom prst="rect">
+            <a:avLst/>
+          </a:prstGeom>
+        </p:spPr>
+        <p:txBody>
+          <a:bodyPr lIns="0" rIns="0" tIns="0" bIns="0">
+            <a:normAutofit/>
+          </a:bodyPr>
+          <a:p>
+            <a:endParaRPr b="0" lang="en-IN" sz="3200" spc="-1" strike="noStrike">
+              <a:latin typeface="Arial"/>
+            </a:endParaRPr>
+          </a:p>
+        </p:txBody>
+      </p:sp>
+      <p:sp>
+        <p:nvSpPr>
+          <p:cNvPr id="53" name="PlaceHolder 3"/>
+          <p:cNvSpPr>
+            <a:spLocks noGrp="1"/>
+          </p:cNvSpPr>
+          <p:nvPr>
+            <p:ph type="body"/>
+          </p:nvPr>
+        </p:nvSpPr>
+        <p:spPr>
+          <a:xfrm>
+            <a:off x="5152680" y="1368000"/>
+            <a:ext cx="4426920" cy="3287880"/>
+          </a:xfrm>
+          <a:prstGeom prst="rect">
+            <a:avLst/>
+          </a:prstGeom>
+        </p:spPr>
+        <p:txBody>
+          <a:bodyPr lIns="0" rIns="0" tIns="0" bIns="0">
+            <a:normAutofit/>
+          </a:bodyPr>
+          <a:p>
+            <a:endParaRPr b="0" lang="en-IN" sz="3200" spc="-1" strike="noStrike">
+              <a:latin typeface="Arial"/>
+            </a:endParaRPr>
+          </a:p>
+        </p:txBody>
+      </p:sp>
+      <p:sp>
+        <p:nvSpPr>
+          <p:cNvPr id="54" name="PlaceHolder 4"/>
+          <p:cNvSpPr>
+            <a:spLocks noGrp="1"/>
+          </p:cNvSpPr>
+          <p:nvPr>
+            <p:ph type="body"/>
+          </p:nvPr>
+        </p:nvSpPr>
+        <p:spPr>
+          <a:xfrm>
+            <a:off x="504000" y="3085560"/>
+            <a:ext cx="4426920" cy="1568160"/>
+          </a:xfrm>
+          <a:prstGeom prst="rect">
+            <a:avLst/>
+          </a:prstGeom>
+        </p:spPr>
+        <p:txBody>
+          <a:bodyPr lIns="0" rIns="0" tIns="0" bIns="0">
+            <a:normAutofit/>
+          </a:bodyPr>
+          <a:p>
+            <a:endParaRPr b="0" lang="en-IN" sz="3200" spc="-1" strike="noStrike">
               <a:latin typeface="Arial"/>
             </a:endParaRPr>
           </a:p>
@@ -578,7 +1110,7 @@
       </p:grpSpPr>
       <p:sp>
         <p:nvSpPr>
-          <p:cNvPr id="6" name="PlaceHolder 1"/>
+          <p:cNvPr id="3" name="PlaceHolder 1"/>
           <p:cNvSpPr>
             <a:spLocks noGrp="1"/>
           </p:cNvSpPr>
@@ -589,7 +1121,7 @@
         <p:spPr>
           <a:xfrm>
             <a:off x="504000" y="216000"/>
-            <a:ext cx="7020000" cy="936000"/>
+            <a:ext cx="7019640" cy="935640"/>
           </a:xfrm>
           <a:prstGeom prst="rect">
             <a:avLst/>
@@ -598,18 +1130,16 @@
         <p:txBody>
           <a:bodyPr lIns="0" rIns="0" tIns="0" bIns="0" anchor="ctr"/>
           <a:p>
-            <a:endParaRPr b="0" lang="en-IN" sz="3570" spc="-1" strike="noStrike">
-              <a:solidFill>
-                <a:srgbClr val="ffffff"/>
-              </a:solidFill>
-              <a:latin typeface="Arial"/>
-            </a:endParaRPr>
-          </a:p>
-        </p:txBody>
-      </p:sp>
-      <p:sp>
-        <p:nvSpPr>
-          <p:cNvPr id="7" name="PlaceHolder 2"/>
+            <a:pPr algn="ctr"/>
+            <a:endParaRPr b="0" lang="en-IN" sz="4400" spc="-1" strike="noStrike">
+              <a:latin typeface="Arial"/>
+            </a:endParaRPr>
+          </a:p>
+        </p:txBody>
+      </p:sp>
+      <p:sp>
+        <p:nvSpPr>
+          <p:cNvPr id="4" name="PlaceHolder 2"/>
           <p:cNvSpPr>
             <a:spLocks noGrp="1"/>
           </p:cNvSpPr>
@@ -620,7 +1150,7 @@
         <p:spPr>
           <a:xfrm>
             <a:off x="504000" y="1368000"/>
-            <a:ext cx="9072000" cy="3288240"/>
+            <a:ext cx="9071640" cy="3287880"/>
           </a:xfrm>
           <a:prstGeom prst="rect">
             <a:avLst/>
@@ -630,6 +1160,801 @@
           <a:bodyPr lIns="0" rIns="0" tIns="0" bIns="0" anchor="ctr"/>
           <a:p>
             <a:pPr algn="ctr"/>
+            <a:endParaRPr b="0" lang="en-IN" sz="3200" spc="-1" strike="noStrike">
+              <a:latin typeface="Arial"/>
+            </a:endParaRPr>
+          </a:p>
+        </p:txBody>
+      </p:sp>
+    </p:spTree>
+  </p:cSld>
+</p:sldLayout>
+</file>
+
+<file path=ppt/slideLayouts/slideLayout20.xml><?xml version="1.0" encoding="utf-8"?>
+<p:sldLayout xmlns:a="http://schemas.openxmlformats.org/drawingml/2006/main" xmlns:p="http://schemas.openxmlformats.org/presentationml/2006/main" xmlns:r="http://schemas.openxmlformats.org/officeDocument/2006/relationships" xmlns:p14="http://schemas.microsoft.com/office/powerpoint/2010/main" xmlns:p15="http://schemas.microsoft.com/office/powerpoint/2012/main" xmlns:mc="http://schemas.openxmlformats.org/markup-compatibility/2006" type="objAndTwoObj" preserve="1">
+  <p:cSld name="Title Content and 2 Content">
+    <p:spTree>
+      <p:nvGrpSpPr>
+        <p:cNvPr id="1" name=""/>
+        <p:cNvGrpSpPr/>
+        <p:nvPr/>
+      </p:nvGrpSpPr>
+      <p:grpSpPr>
+        <a:xfrm>
+          <a:off x="0" y="0"/>
+          <a:ext cx="0" cy="0"/>
+          <a:chOff x="0" y="0"/>
+          <a:chExt cx="0" cy="0"/>
+        </a:xfrm>
+      </p:grpSpPr>
+      <p:sp>
+        <p:nvSpPr>
+          <p:cNvPr id="55" name="PlaceHolder 1"/>
+          <p:cNvSpPr>
+            <a:spLocks noGrp="1"/>
+          </p:cNvSpPr>
+          <p:nvPr>
+            <p:ph type="title"/>
+          </p:nvPr>
+        </p:nvSpPr>
+        <p:spPr>
+          <a:xfrm>
+            <a:off x="504000" y="216000"/>
+            <a:ext cx="7019640" cy="935640"/>
+          </a:xfrm>
+          <a:prstGeom prst="rect">
+            <a:avLst/>
+          </a:prstGeom>
+        </p:spPr>
+        <p:txBody>
+          <a:bodyPr lIns="0" rIns="0" tIns="0" bIns="0" anchor="ctr"/>
+          <a:p>
+            <a:pPr algn="ctr"/>
+            <a:endParaRPr b="0" lang="en-IN" sz="4400" spc="-1" strike="noStrike">
+              <a:latin typeface="Arial"/>
+            </a:endParaRPr>
+          </a:p>
+        </p:txBody>
+      </p:sp>
+      <p:sp>
+        <p:nvSpPr>
+          <p:cNvPr id="56" name="PlaceHolder 2"/>
+          <p:cNvSpPr>
+            <a:spLocks noGrp="1"/>
+          </p:cNvSpPr>
+          <p:nvPr>
+            <p:ph type="body"/>
+          </p:nvPr>
+        </p:nvSpPr>
+        <p:spPr>
+          <a:xfrm>
+            <a:off x="504000" y="1368000"/>
+            <a:ext cx="4426920" cy="3287880"/>
+          </a:xfrm>
+          <a:prstGeom prst="rect">
+            <a:avLst/>
+          </a:prstGeom>
+        </p:spPr>
+        <p:txBody>
+          <a:bodyPr lIns="0" rIns="0" tIns="0" bIns="0">
+            <a:normAutofit/>
+          </a:bodyPr>
+          <a:p>
+            <a:endParaRPr b="0" lang="en-IN" sz="3200" spc="-1" strike="noStrike">
+              <a:latin typeface="Arial"/>
+            </a:endParaRPr>
+          </a:p>
+        </p:txBody>
+      </p:sp>
+      <p:sp>
+        <p:nvSpPr>
+          <p:cNvPr id="57" name="PlaceHolder 3"/>
+          <p:cNvSpPr>
+            <a:spLocks noGrp="1"/>
+          </p:cNvSpPr>
+          <p:nvPr>
+            <p:ph type="body"/>
+          </p:nvPr>
+        </p:nvSpPr>
+        <p:spPr>
+          <a:xfrm>
+            <a:off x="5152680" y="1368000"/>
+            <a:ext cx="4426920" cy="1568160"/>
+          </a:xfrm>
+          <a:prstGeom prst="rect">
+            <a:avLst/>
+          </a:prstGeom>
+        </p:spPr>
+        <p:txBody>
+          <a:bodyPr lIns="0" rIns="0" tIns="0" bIns="0">
+            <a:normAutofit/>
+          </a:bodyPr>
+          <a:p>
+            <a:endParaRPr b="0" lang="en-IN" sz="3200" spc="-1" strike="noStrike">
+              <a:latin typeface="Arial"/>
+            </a:endParaRPr>
+          </a:p>
+        </p:txBody>
+      </p:sp>
+      <p:sp>
+        <p:nvSpPr>
+          <p:cNvPr id="58" name="PlaceHolder 4"/>
+          <p:cNvSpPr>
+            <a:spLocks noGrp="1"/>
+          </p:cNvSpPr>
+          <p:nvPr>
+            <p:ph type="body"/>
+          </p:nvPr>
+        </p:nvSpPr>
+        <p:spPr>
+          <a:xfrm>
+            <a:off x="5152680" y="3085560"/>
+            <a:ext cx="4426920" cy="1568160"/>
+          </a:xfrm>
+          <a:prstGeom prst="rect">
+            <a:avLst/>
+          </a:prstGeom>
+        </p:spPr>
+        <p:txBody>
+          <a:bodyPr lIns="0" rIns="0" tIns="0" bIns="0">
+            <a:normAutofit/>
+          </a:bodyPr>
+          <a:p>
+            <a:endParaRPr b="0" lang="en-IN" sz="3200" spc="-1" strike="noStrike">
+              <a:latin typeface="Arial"/>
+            </a:endParaRPr>
+          </a:p>
+        </p:txBody>
+      </p:sp>
+    </p:spTree>
+  </p:cSld>
+</p:sldLayout>
+</file>
+
+<file path=ppt/slideLayouts/slideLayout21.xml><?xml version="1.0" encoding="utf-8"?>
+<p:sldLayout xmlns:a="http://schemas.openxmlformats.org/drawingml/2006/main" xmlns:p="http://schemas.openxmlformats.org/presentationml/2006/main" xmlns:r="http://schemas.openxmlformats.org/officeDocument/2006/relationships" xmlns:p14="http://schemas.microsoft.com/office/powerpoint/2010/main" xmlns:p15="http://schemas.microsoft.com/office/powerpoint/2012/main" xmlns:mc="http://schemas.openxmlformats.org/markup-compatibility/2006" type="twoObjOverTx" preserve="1">
+  <p:cSld name="Title, 2 Content over Content">
+    <p:spTree>
+      <p:nvGrpSpPr>
+        <p:cNvPr id="1" name=""/>
+        <p:cNvGrpSpPr/>
+        <p:nvPr/>
+      </p:nvGrpSpPr>
+      <p:grpSpPr>
+        <a:xfrm>
+          <a:off x="0" y="0"/>
+          <a:ext cx="0" cy="0"/>
+          <a:chOff x="0" y="0"/>
+          <a:chExt cx="0" cy="0"/>
+        </a:xfrm>
+      </p:grpSpPr>
+      <p:sp>
+        <p:nvSpPr>
+          <p:cNvPr id="59" name="PlaceHolder 1"/>
+          <p:cNvSpPr>
+            <a:spLocks noGrp="1"/>
+          </p:cNvSpPr>
+          <p:nvPr>
+            <p:ph type="title"/>
+          </p:nvPr>
+        </p:nvSpPr>
+        <p:spPr>
+          <a:xfrm>
+            <a:off x="504000" y="216000"/>
+            <a:ext cx="7019640" cy="935640"/>
+          </a:xfrm>
+          <a:prstGeom prst="rect">
+            <a:avLst/>
+          </a:prstGeom>
+        </p:spPr>
+        <p:txBody>
+          <a:bodyPr lIns="0" rIns="0" tIns="0" bIns="0" anchor="ctr"/>
+          <a:p>
+            <a:pPr algn="ctr"/>
+            <a:endParaRPr b="0" lang="en-IN" sz="4400" spc="-1" strike="noStrike">
+              <a:latin typeface="Arial"/>
+            </a:endParaRPr>
+          </a:p>
+        </p:txBody>
+      </p:sp>
+      <p:sp>
+        <p:nvSpPr>
+          <p:cNvPr id="60" name="PlaceHolder 2"/>
+          <p:cNvSpPr>
+            <a:spLocks noGrp="1"/>
+          </p:cNvSpPr>
+          <p:nvPr>
+            <p:ph type="body"/>
+          </p:nvPr>
+        </p:nvSpPr>
+        <p:spPr>
+          <a:xfrm>
+            <a:off x="504000" y="1368000"/>
+            <a:ext cx="4426920" cy="1568160"/>
+          </a:xfrm>
+          <a:prstGeom prst="rect">
+            <a:avLst/>
+          </a:prstGeom>
+        </p:spPr>
+        <p:txBody>
+          <a:bodyPr lIns="0" rIns="0" tIns="0" bIns="0">
+            <a:normAutofit/>
+          </a:bodyPr>
+          <a:p>
+            <a:endParaRPr b="0" lang="en-IN" sz="3200" spc="-1" strike="noStrike">
+              <a:latin typeface="Arial"/>
+            </a:endParaRPr>
+          </a:p>
+        </p:txBody>
+      </p:sp>
+      <p:sp>
+        <p:nvSpPr>
+          <p:cNvPr id="61" name="PlaceHolder 3"/>
+          <p:cNvSpPr>
+            <a:spLocks noGrp="1"/>
+          </p:cNvSpPr>
+          <p:nvPr>
+            <p:ph type="body"/>
+          </p:nvPr>
+        </p:nvSpPr>
+        <p:spPr>
+          <a:xfrm>
+            <a:off x="5152680" y="1368000"/>
+            <a:ext cx="4426920" cy="1568160"/>
+          </a:xfrm>
+          <a:prstGeom prst="rect">
+            <a:avLst/>
+          </a:prstGeom>
+        </p:spPr>
+        <p:txBody>
+          <a:bodyPr lIns="0" rIns="0" tIns="0" bIns="0">
+            <a:normAutofit/>
+          </a:bodyPr>
+          <a:p>
+            <a:endParaRPr b="0" lang="en-IN" sz="3200" spc="-1" strike="noStrike">
+              <a:latin typeface="Arial"/>
+            </a:endParaRPr>
+          </a:p>
+        </p:txBody>
+      </p:sp>
+      <p:sp>
+        <p:nvSpPr>
+          <p:cNvPr id="62" name="PlaceHolder 4"/>
+          <p:cNvSpPr>
+            <a:spLocks noGrp="1"/>
+          </p:cNvSpPr>
+          <p:nvPr>
+            <p:ph type="body"/>
+          </p:nvPr>
+        </p:nvSpPr>
+        <p:spPr>
+          <a:xfrm>
+            <a:off x="504000" y="3085560"/>
+            <a:ext cx="9071640" cy="1568160"/>
+          </a:xfrm>
+          <a:prstGeom prst="rect">
+            <a:avLst/>
+          </a:prstGeom>
+        </p:spPr>
+        <p:txBody>
+          <a:bodyPr lIns="0" rIns="0" tIns="0" bIns="0">
+            <a:normAutofit/>
+          </a:bodyPr>
+          <a:p>
+            <a:endParaRPr b="0" lang="en-IN" sz="3200" spc="-1" strike="noStrike">
+              <a:latin typeface="Arial"/>
+            </a:endParaRPr>
+          </a:p>
+        </p:txBody>
+      </p:sp>
+    </p:spTree>
+  </p:cSld>
+</p:sldLayout>
+</file>
+
+<file path=ppt/slideLayouts/slideLayout22.xml><?xml version="1.0" encoding="utf-8"?>
+<p:sldLayout xmlns:a="http://schemas.openxmlformats.org/drawingml/2006/main" xmlns:p="http://schemas.openxmlformats.org/presentationml/2006/main" xmlns:r="http://schemas.openxmlformats.org/officeDocument/2006/relationships" xmlns:p14="http://schemas.microsoft.com/office/powerpoint/2010/main" xmlns:p15="http://schemas.microsoft.com/office/powerpoint/2012/main" xmlns:mc="http://schemas.openxmlformats.org/markup-compatibility/2006" type="objOverTx" preserve="1">
+  <p:cSld name="Title, Content over Content">
+    <p:spTree>
+      <p:nvGrpSpPr>
+        <p:cNvPr id="1" name=""/>
+        <p:cNvGrpSpPr/>
+        <p:nvPr/>
+      </p:nvGrpSpPr>
+      <p:grpSpPr>
+        <a:xfrm>
+          <a:off x="0" y="0"/>
+          <a:ext cx="0" cy="0"/>
+          <a:chOff x="0" y="0"/>
+          <a:chExt cx="0" cy="0"/>
+        </a:xfrm>
+      </p:grpSpPr>
+      <p:sp>
+        <p:nvSpPr>
+          <p:cNvPr id="63" name="PlaceHolder 1"/>
+          <p:cNvSpPr>
+            <a:spLocks noGrp="1"/>
+          </p:cNvSpPr>
+          <p:nvPr>
+            <p:ph type="title"/>
+          </p:nvPr>
+        </p:nvSpPr>
+        <p:spPr>
+          <a:xfrm>
+            <a:off x="504000" y="216000"/>
+            <a:ext cx="7019640" cy="935640"/>
+          </a:xfrm>
+          <a:prstGeom prst="rect">
+            <a:avLst/>
+          </a:prstGeom>
+        </p:spPr>
+        <p:txBody>
+          <a:bodyPr lIns="0" rIns="0" tIns="0" bIns="0" anchor="ctr"/>
+          <a:p>
+            <a:pPr algn="ctr"/>
+            <a:endParaRPr b="0" lang="en-IN" sz="4400" spc="-1" strike="noStrike">
+              <a:latin typeface="Arial"/>
+            </a:endParaRPr>
+          </a:p>
+        </p:txBody>
+      </p:sp>
+      <p:sp>
+        <p:nvSpPr>
+          <p:cNvPr id="64" name="PlaceHolder 2"/>
+          <p:cNvSpPr>
+            <a:spLocks noGrp="1"/>
+          </p:cNvSpPr>
+          <p:nvPr>
+            <p:ph type="body"/>
+          </p:nvPr>
+        </p:nvSpPr>
+        <p:spPr>
+          <a:xfrm>
+            <a:off x="504000" y="1368000"/>
+            <a:ext cx="9071640" cy="1568160"/>
+          </a:xfrm>
+          <a:prstGeom prst="rect">
+            <a:avLst/>
+          </a:prstGeom>
+        </p:spPr>
+        <p:txBody>
+          <a:bodyPr lIns="0" rIns="0" tIns="0" bIns="0">
+            <a:normAutofit/>
+          </a:bodyPr>
+          <a:p>
+            <a:endParaRPr b="0" lang="en-IN" sz="3200" spc="-1" strike="noStrike">
+              <a:latin typeface="Arial"/>
+            </a:endParaRPr>
+          </a:p>
+        </p:txBody>
+      </p:sp>
+      <p:sp>
+        <p:nvSpPr>
+          <p:cNvPr id="65" name="PlaceHolder 3"/>
+          <p:cNvSpPr>
+            <a:spLocks noGrp="1"/>
+          </p:cNvSpPr>
+          <p:nvPr>
+            <p:ph type="body"/>
+          </p:nvPr>
+        </p:nvSpPr>
+        <p:spPr>
+          <a:xfrm>
+            <a:off x="504000" y="3085560"/>
+            <a:ext cx="9071640" cy="1568160"/>
+          </a:xfrm>
+          <a:prstGeom prst="rect">
+            <a:avLst/>
+          </a:prstGeom>
+        </p:spPr>
+        <p:txBody>
+          <a:bodyPr lIns="0" rIns="0" tIns="0" bIns="0">
+            <a:normAutofit/>
+          </a:bodyPr>
+          <a:p>
+            <a:endParaRPr b="0" lang="en-IN" sz="3200" spc="-1" strike="noStrike">
+              <a:latin typeface="Arial"/>
+            </a:endParaRPr>
+          </a:p>
+        </p:txBody>
+      </p:sp>
+    </p:spTree>
+  </p:cSld>
+</p:sldLayout>
+</file>
+
+<file path=ppt/slideLayouts/slideLayout23.xml><?xml version="1.0" encoding="utf-8"?>
+<p:sldLayout xmlns:a="http://schemas.openxmlformats.org/drawingml/2006/main" xmlns:p="http://schemas.openxmlformats.org/presentationml/2006/main" xmlns:r="http://schemas.openxmlformats.org/officeDocument/2006/relationships" xmlns:p14="http://schemas.microsoft.com/office/powerpoint/2010/main" xmlns:p15="http://schemas.microsoft.com/office/powerpoint/2012/main" xmlns:mc="http://schemas.openxmlformats.org/markup-compatibility/2006" type="fourObj" preserve="1">
+  <p:cSld name="Title, 4 Content">
+    <p:spTree>
+      <p:nvGrpSpPr>
+        <p:cNvPr id="1" name=""/>
+        <p:cNvGrpSpPr/>
+        <p:nvPr/>
+      </p:nvGrpSpPr>
+      <p:grpSpPr>
+        <a:xfrm>
+          <a:off x="0" y="0"/>
+          <a:ext cx="0" cy="0"/>
+          <a:chOff x="0" y="0"/>
+          <a:chExt cx="0" cy="0"/>
+        </a:xfrm>
+      </p:grpSpPr>
+      <p:sp>
+        <p:nvSpPr>
+          <p:cNvPr id="66" name="PlaceHolder 1"/>
+          <p:cNvSpPr>
+            <a:spLocks noGrp="1"/>
+          </p:cNvSpPr>
+          <p:nvPr>
+            <p:ph type="title"/>
+          </p:nvPr>
+        </p:nvSpPr>
+        <p:spPr>
+          <a:xfrm>
+            <a:off x="504000" y="216000"/>
+            <a:ext cx="7019640" cy="935640"/>
+          </a:xfrm>
+          <a:prstGeom prst="rect">
+            <a:avLst/>
+          </a:prstGeom>
+        </p:spPr>
+        <p:txBody>
+          <a:bodyPr lIns="0" rIns="0" tIns="0" bIns="0" anchor="ctr"/>
+          <a:p>
+            <a:pPr algn="ctr"/>
+            <a:endParaRPr b="0" lang="en-IN" sz="4400" spc="-1" strike="noStrike">
+              <a:latin typeface="Arial"/>
+            </a:endParaRPr>
+          </a:p>
+        </p:txBody>
+      </p:sp>
+      <p:sp>
+        <p:nvSpPr>
+          <p:cNvPr id="67" name="PlaceHolder 2"/>
+          <p:cNvSpPr>
+            <a:spLocks noGrp="1"/>
+          </p:cNvSpPr>
+          <p:nvPr>
+            <p:ph type="body"/>
+          </p:nvPr>
+        </p:nvSpPr>
+        <p:spPr>
+          <a:xfrm>
+            <a:off x="504000" y="1368000"/>
+            <a:ext cx="4426920" cy="1568160"/>
+          </a:xfrm>
+          <a:prstGeom prst="rect">
+            <a:avLst/>
+          </a:prstGeom>
+        </p:spPr>
+        <p:txBody>
+          <a:bodyPr lIns="0" rIns="0" tIns="0" bIns="0">
+            <a:normAutofit/>
+          </a:bodyPr>
+          <a:p>
+            <a:endParaRPr b="0" lang="en-IN" sz="3200" spc="-1" strike="noStrike">
+              <a:latin typeface="Arial"/>
+            </a:endParaRPr>
+          </a:p>
+        </p:txBody>
+      </p:sp>
+      <p:sp>
+        <p:nvSpPr>
+          <p:cNvPr id="68" name="PlaceHolder 3"/>
+          <p:cNvSpPr>
+            <a:spLocks noGrp="1"/>
+          </p:cNvSpPr>
+          <p:nvPr>
+            <p:ph type="body"/>
+          </p:nvPr>
+        </p:nvSpPr>
+        <p:spPr>
+          <a:xfrm>
+            <a:off x="5152680" y="1368000"/>
+            <a:ext cx="4426920" cy="1568160"/>
+          </a:xfrm>
+          <a:prstGeom prst="rect">
+            <a:avLst/>
+          </a:prstGeom>
+        </p:spPr>
+        <p:txBody>
+          <a:bodyPr lIns="0" rIns="0" tIns="0" bIns="0">
+            <a:normAutofit/>
+          </a:bodyPr>
+          <a:p>
+            <a:endParaRPr b="0" lang="en-IN" sz="3200" spc="-1" strike="noStrike">
+              <a:latin typeface="Arial"/>
+            </a:endParaRPr>
+          </a:p>
+        </p:txBody>
+      </p:sp>
+      <p:sp>
+        <p:nvSpPr>
+          <p:cNvPr id="69" name="PlaceHolder 4"/>
+          <p:cNvSpPr>
+            <a:spLocks noGrp="1"/>
+          </p:cNvSpPr>
+          <p:nvPr>
+            <p:ph type="body"/>
+          </p:nvPr>
+        </p:nvSpPr>
+        <p:spPr>
+          <a:xfrm>
+            <a:off x="504000" y="3085560"/>
+            <a:ext cx="4426920" cy="1568160"/>
+          </a:xfrm>
+          <a:prstGeom prst="rect">
+            <a:avLst/>
+          </a:prstGeom>
+        </p:spPr>
+        <p:txBody>
+          <a:bodyPr lIns="0" rIns="0" tIns="0" bIns="0">
+            <a:normAutofit/>
+          </a:bodyPr>
+          <a:p>
+            <a:endParaRPr b="0" lang="en-IN" sz="3200" spc="-1" strike="noStrike">
+              <a:latin typeface="Arial"/>
+            </a:endParaRPr>
+          </a:p>
+        </p:txBody>
+      </p:sp>
+      <p:sp>
+        <p:nvSpPr>
+          <p:cNvPr id="70" name="PlaceHolder 5"/>
+          <p:cNvSpPr>
+            <a:spLocks noGrp="1"/>
+          </p:cNvSpPr>
+          <p:nvPr>
+            <p:ph type="body"/>
+          </p:nvPr>
+        </p:nvSpPr>
+        <p:spPr>
+          <a:xfrm>
+            <a:off x="5152680" y="3085560"/>
+            <a:ext cx="4426920" cy="1568160"/>
+          </a:xfrm>
+          <a:prstGeom prst="rect">
+            <a:avLst/>
+          </a:prstGeom>
+        </p:spPr>
+        <p:txBody>
+          <a:bodyPr lIns="0" rIns="0" tIns="0" bIns="0">
+            <a:normAutofit/>
+          </a:bodyPr>
+          <a:p>
+            <a:endParaRPr b="0" lang="en-IN" sz="3200" spc="-1" strike="noStrike">
+              <a:latin typeface="Arial"/>
+            </a:endParaRPr>
+          </a:p>
+        </p:txBody>
+      </p:sp>
+    </p:spTree>
+  </p:cSld>
+</p:sldLayout>
+</file>
+
+<file path=ppt/slideLayouts/slideLayout24.xml><?xml version="1.0" encoding="utf-8"?>
+<p:sldLayout xmlns:a="http://schemas.openxmlformats.org/drawingml/2006/main" xmlns:p="http://schemas.openxmlformats.org/presentationml/2006/main" xmlns:r="http://schemas.openxmlformats.org/officeDocument/2006/relationships" xmlns:p14="http://schemas.microsoft.com/office/powerpoint/2010/main" xmlns:p15="http://schemas.microsoft.com/office/powerpoint/2012/main" xmlns:mc="http://schemas.openxmlformats.org/markup-compatibility/2006" type="blank" preserve="1">
+  <p:cSld name="Title, 6 Content">
+    <p:spTree>
+      <p:nvGrpSpPr>
+        <p:cNvPr id="1" name=""/>
+        <p:cNvGrpSpPr/>
+        <p:nvPr/>
+      </p:nvGrpSpPr>
+      <p:grpSpPr>
+        <a:xfrm>
+          <a:off x="0" y="0"/>
+          <a:ext cx="0" cy="0"/>
+          <a:chOff x="0" y="0"/>
+          <a:chExt cx="0" cy="0"/>
+        </a:xfrm>
+      </p:grpSpPr>
+      <p:sp>
+        <p:nvSpPr>
+          <p:cNvPr id="71" name="PlaceHolder 1"/>
+          <p:cNvSpPr>
+            <a:spLocks noGrp="1"/>
+          </p:cNvSpPr>
+          <p:nvPr>
+            <p:ph type="title"/>
+          </p:nvPr>
+        </p:nvSpPr>
+        <p:spPr>
+          <a:xfrm>
+            <a:off x="504000" y="216000"/>
+            <a:ext cx="7019640" cy="935640"/>
+          </a:xfrm>
+          <a:prstGeom prst="rect">
+            <a:avLst/>
+          </a:prstGeom>
+        </p:spPr>
+        <p:txBody>
+          <a:bodyPr lIns="0" rIns="0" tIns="0" bIns="0" anchor="ctr"/>
+          <a:p>
+            <a:pPr algn="ctr"/>
+            <a:endParaRPr b="0" lang="en-IN" sz="4400" spc="-1" strike="noStrike">
+              <a:latin typeface="Arial"/>
+            </a:endParaRPr>
+          </a:p>
+        </p:txBody>
+      </p:sp>
+      <p:sp>
+        <p:nvSpPr>
+          <p:cNvPr id="72" name="PlaceHolder 2"/>
+          <p:cNvSpPr>
+            <a:spLocks noGrp="1"/>
+          </p:cNvSpPr>
+          <p:nvPr>
+            <p:ph type="body"/>
+          </p:nvPr>
+        </p:nvSpPr>
+        <p:spPr>
+          <a:xfrm>
+            <a:off x="504000" y="1368000"/>
+            <a:ext cx="2920680" cy="1568160"/>
+          </a:xfrm>
+          <a:prstGeom prst="rect">
+            <a:avLst/>
+          </a:prstGeom>
+        </p:spPr>
+        <p:txBody>
+          <a:bodyPr lIns="0" rIns="0" tIns="0" bIns="0">
+            <a:normAutofit/>
+          </a:bodyPr>
+          <a:p>
+            <a:endParaRPr b="0" lang="en-IN" sz="3200" spc="-1" strike="noStrike">
+              <a:latin typeface="Arial"/>
+            </a:endParaRPr>
+          </a:p>
+        </p:txBody>
+      </p:sp>
+      <p:sp>
+        <p:nvSpPr>
+          <p:cNvPr id="73" name="PlaceHolder 3"/>
+          <p:cNvSpPr>
+            <a:spLocks noGrp="1"/>
+          </p:cNvSpPr>
+          <p:nvPr>
+            <p:ph type="body"/>
+          </p:nvPr>
+        </p:nvSpPr>
+        <p:spPr>
+          <a:xfrm>
+            <a:off x="3571200" y="1368000"/>
+            <a:ext cx="2920680" cy="1568160"/>
+          </a:xfrm>
+          <a:prstGeom prst="rect">
+            <a:avLst/>
+          </a:prstGeom>
+        </p:spPr>
+        <p:txBody>
+          <a:bodyPr lIns="0" rIns="0" tIns="0" bIns="0">
+            <a:normAutofit/>
+          </a:bodyPr>
+          <a:p>
+            <a:endParaRPr b="0" lang="en-IN" sz="3200" spc="-1" strike="noStrike">
+              <a:latin typeface="Arial"/>
+            </a:endParaRPr>
+          </a:p>
+        </p:txBody>
+      </p:sp>
+      <p:sp>
+        <p:nvSpPr>
+          <p:cNvPr id="74" name="PlaceHolder 4"/>
+          <p:cNvSpPr>
+            <a:spLocks noGrp="1"/>
+          </p:cNvSpPr>
+          <p:nvPr>
+            <p:ph type="body"/>
+          </p:nvPr>
+        </p:nvSpPr>
+        <p:spPr>
+          <a:xfrm>
+            <a:off x="6638040" y="1368000"/>
+            <a:ext cx="2920680" cy="1568160"/>
+          </a:xfrm>
+          <a:prstGeom prst="rect">
+            <a:avLst/>
+          </a:prstGeom>
+        </p:spPr>
+        <p:txBody>
+          <a:bodyPr lIns="0" rIns="0" tIns="0" bIns="0">
+            <a:normAutofit/>
+          </a:bodyPr>
+          <a:p>
+            <a:endParaRPr b="0" lang="en-IN" sz="3200" spc="-1" strike="noStrike">
+              <a:latin typeface="Arial"/>
+            </a:endParaRPr>
+          </a:p>
+        </p:txBody>
+      </p:sp>
+      <p:sp>
+        <p:nvSpPr>
+          <p:cNvPr id="75" name="PlaceHolder 5"/>
+          <p:cNvSpPr>
+            <a:spLocks noGrp="1"/>
+          </p:cNvSpPr>
+          <p:nvPr>
+            <p:ph type="body"/>
+          </p:nvPr>
+        </p:nvSpPr>
+        <p:spPr>
+          <a:xfrm>
+            <a:off x="504000" y="3085560"/>
+            <a:ext cx="2920680" cy="1568160"/>
+          </a:xfrm>
+          <a:prstGeom prst="rect">
+            <a:avLst/>
+          </a:prstGeom>
+        </p:spPr>
+        <p:txBody>
+          <a:bodyPr lIns="0" rIns="0" tIns="0" bIns="0">
+            <a:normAutofit/>
+          </a:bodyPr>
+          <a:p>
+            <a:endParaRPr b="0" lang="en-IN" sz="3200" spc="-1" strike="noStrike">
+              <a:latin typeface="Arial"/>
+            </a:endParaRPr>
+          </a:p>
+        </p:txBody>
+      </p:sp>
+      <p:sp>
+        <p:nvSpPr>
+          <p:cNvPr id="76" name="PlaceHolder 6"/>
+          <p:cNvSpPr>
+            <a:spLocks noGrp="1"/>
+          </p:cNvSpPr>
+          <p:nvPr>
+            <p:ph type="body"/>
+          </p:nvPr>
+        </p:nvSpPr>
+        <p:spPr>
+          <a:xfrm>
+            <a:off x="3571200" y="3085560"/>
+            <a:ext cx="2920680" cy="1568160"/>
+          </a:xfrm>
+          <a:prstGeom prst="rect">
+            <a:avLst/>
+          </a:prstGeom>
+        </p:spPr>
+        <p:txBody>
+          <a:bodyPr lIns="0" rIns="0" tIns="0" bIns="0">
+            <a:normAutofit/>
+          </a:bodyPr>
+          <a:p>
+            <a:endParaRPr b="0" lang="en-IN" sz="3200" spc="-1" strike="noStrike">
+              <a:latin typeface="Arial"/>
+            </a:endParaRPr>
+          </a:p>
+        </p:txBody>
+      </p:sp>
+      <p:sp>
+        <p:nvSpPr>
+          <p:cNvPr id="77" name="PlaceHolder 7"/>
+          <p:cNvSpPr>
+            <a:spLocks noGrp="1"/>
+          </p:cNvSpPr>
+          <p:nvPr>
+            <p:ph type="body"/>
+          </p:nvPr>
+        </p:nvSpPr>
+        <p:spPr>
+          <a:xfrm>
+            <a:off x="6638040" y="3085560"/>
+            <a:ext cx="2920680" cy="1568160"/>
+          </a:xfrm>
+          <a:prstGeom prst="rect">
+            <a:avLst/>
+          </a:prstGeom>
+        </p:spPr>
+        <p:txBody>
+          <a:bodyPr lIns="0" rIns="0" tIns="0" bIns="0">
+            <a:normAutofit/>
+          </a:bodyPr>
+          <a:p>
             <a:endParaRPr b="0" lang="en-IN" sz="3200" spc="-1" strike="noStrike">
               <a:latin typeface="Arial"/>
             </a:endParaRPr>
@@ -660,7 +1985,7 @@
       </p:grpSpPr>
       <p:sp>
         <p:nvSpPr>
-          <p:cNvPr id="8" name="PlaceHolder 1"/>
+          <p:cNvPr id="5" name="PlaceHolder 1"/>
           <p:cNvSpPr>
             <a:spLocks noGrp="1"/>
           </p:cNvSpPr>
@@ -671,7 +1996,7 @@
         <p:spPr>
           <a:xfrm>
             <a:off x="504000" y="216000"/>
-            <a:ext cx="7020000" cy="936000"/>
+            <a:ext cx="7019640" cy="935640"/>
           </a:xfrm>
           <a:prstGeom prst="rect">
             <a:avLst/>
@@ -680,18 +2005,16 @@
         <p:txBody>
           <a:bodyPr lIns="0" rIns="0" tIns="0" bIns="0" anchor="ctr"/>
           <a:p>
-            <a:endParaRPr b="0" lang="en-IN" sz="3570" spc="-1" strike="noStrike">
-              <a:solidFill>
-                <a:srgbClr val="ffffff"/>
-              </a:solidFill>
-              <a:latin typeface="Arial"/>
-            </a:endParaRPr>
-          </a:p>
-        </p:txBody>
-      </p:sp>
-      <p:sp>
-        <p:nvSpPr>
-          <p:cNvPr id="9" name="PlaceHolder 2"/>
+            <a:pPr algn="ctr"/>
+            <a:endParaRPr b="0" lang="en-IN" sz="4400" spc="-1" strike="noStrike">
+              <a:latin typeface="Arial"/>
+            </a:endParaRPr>
+          </a:p>
+        </p:txBody>
+      </p:sp>
+      <p:sp>
+        <p:nvSpPr>
+          <p:cNvPr id="6" name="PlaceHolder 2"/>
           <p:cNvSpPr>
             <a:spLocks noGrp="1"/>
           </p:cNvSpPr>
@@ -702,18 +2025,18 @@
         <p:spPr>
           <a:xfrm>
             <a:off x="504000" y="1368000"/>
-            <a:ext cx="9072000" cy="3288240"/>
-          </a:xfrm>
-          <a:prstGeom prst="rect">
-            <a:avLst/>
-          </a:prstGeom>
-        </p:spPr>
-        <p:txBody>
-          <a:bodyPr lIns="0" rIns="0" tIns="0" bIns="0">
-            <a:normAutofit/>
-          </a:bodyPr>
-          <a:p>
-            <a:endParaRPr b="0" lang="en-IN" sz="2600" spc="-1" strike="noStrike">
+            <a:ext cx="9071640" cy="3287880"/>
+          </a:xfrm>
+          <a:prstGeom prst="rect">
+            <a:avLst/>
+          </a:prstGeom>
+        </p:spPr>
+        <p:txBody>
+          <a:bodyPr lIns="0" rIns="0" tIns="0" bIns="0">
+            <a:normAutofit/>
+          </a:bodyPr>
+          <a:p>
+            <a:endParaRPr b="0" lang="en-IN" sz="3200" spc="-1" strike="noStrike">
               <a:latin typeface="Arial"/>
             </a:endParaRPr>
           </a:p>
@@ -743,7 +2066,7 @@
       </p:grpSpPr>
       <p:sp>
         <p:nvSpPr>
-          <p:cNvPr id="10" name="PlaceHolder 1"/>
+          <p:cNvPr id="7" name="PlaceHolder 1"/>
           <p:cNvSpPr>
             <a:spLocks noGrp="1"/>
           </p:cNvSpPr>
@@ -754,7 +2077,7 @@
         <p:spPr>
           <a:xfrm>
             <a:off x="504000" y="216000"/>
-            <a:ext cx="7020000" cy="936000"/>
+            <a:ext cx="7019640" cy="935640"/>
           </a:xfrm>
           <a:prstGeom prst="rect">
             <a:avLst/>
@@ -763,18 +2086,16 @@
         <p:txBody>
           <a:bodyPr lIns="0" rIns="0" tIns="0" bIns="0" anchor="ctr"/>
           <a:p>
-            <a:endParaRPr b="0" lang="en-IN" sz="3570" spc="-1" strike="noStrike">
-              <a:solidFill>
-                <a:srgbClr val="ffffff"/>
-              </a:solidFill>
-              <a:latin typeface="Arial"/>
-            </a:endParaRPr>
-          </a:p>
-        </p:txBody>
-      </p:sp>
-      <p:sp>
-        <p:nvSpPr>
-          <p:cNvPr id="11" name="PlaceHolder 2"/>
+            <a:pPr algn="ctr"/>
+            <a:endParaRPr b="0" lang="en-IN" sz="4400" spc="-1" strike="noStrike">
+              <a:latin typeface="Arial"/>
+            </a:endParaRPr>
+          </a:p>
+        </p:txBody>
+      </p:sp>
+      <p:sp>
+        <p:nvSpPr>
+          <p:cNvPr id="8" name="PlaceHolder 2"/>
           <p:cNvSpPr>
             <a:spLocks noGrp="1"/>
           </p:cNvSpPr>
@@ -785,26 +2106,26 @@
         <p:spPr>
           <a:xfrm>
             <a:off x="504000" y="1368000"/>
-            <a:ext cx="4426920" cy="3288240"/>
-          </a:xfrm>
-          <a:prstGeom prst="rect">
-            <a:avLst/>
-          </a:prstGeom>
-        </p:spPr>
-        <p:txBody>
-          <a:bodyPr lIns="0" rIns="0" tIns="0" bIns="0">
-            <a:normAutofit/>
-          </a:bodyPr>
-          <a:p>
-            <a:endParaRPr b="0" lang="en-IN" sz="2600" spc="-1" strike="noStrike">
-              <a:latin typeface="Arial"/>
-            </a:endParaRPr>
-          </a:p>
-        </p:txBody>
-      </p:sp>
-      <p:sp>
-        <p:nvSpPr>
-          <p:cNvPr id="12" name="PlaceHolder 3"/>
+            <a:ext cx="4426920" cy="3287880"/>
+          </a:xfrm>
+          <a:prstGeom prst="rect">
+            <a:avLst/>
+          </a:prstGeom>
+        </p:spPr>
+        <p:txBody>
+          <a:bodyPr lIns="0" rIns="0" tIns="0" bIns="0">
+            <a:normAutofit/>
+          </a:bodyPr>
+          <a:p>
+            <a:endParaRPr b="0" lang="en-IN" sz="3200" spc="-1" strike="noStrike">
+              <a:latin typeface="Arial"/>
+            </a:endParaRPr>
+          </a:p>
+        </p:txBody>
+      </p:sp>
+      <p:sp>
+        <p:nvSpPr>
+          <p:cNvPr id="9" name="PlaceHolder 3"/>
           <p:cNvSpPr>
             <a:spLocks noGrp="1"/>
           </p:cNvSpPr>
@@ -815,18 +2136,18 @@
         <p:spPr>
           <a:xfrm>
             <a:off x="5152680" y="1368000"/>
-            <a:ext cx="4426920" cy="3288240"/>
-          </a:xfrm>
-          <a:prstGeom prst="rect">
-            <a:avLst/>
-          </a:prstGeom>
-        </p:spPr>
-        <p:txBody>
-          <a:bodyPr lIns="0" rIns="0" tIns="0" bIns="0">
-            <a:normAutofit/>
-          </a:bodyPr>
-          <a:p>
-            <a:endParaRPr b="0" lang="en-IN" sz="2600" spc="-1" strike="noStrike">
+            <a:ext cx="4426920" cy="3287880"/>
+          </a:xfrm>
+          <a:prstGeom prst="rect">
+            <a:avLst/>
+          </a:prstGeom>
+        </p:spPr>
+        <p:txBody>
+          <a:bodyPr lIns="0" rIns="0" tIns="0" bIns="0">
+            <a:normAutofit/>
+          </a:bodyPr>
+          <a:p>
+            <a:endParaRPr b="0" lang="en-IN" sz="3200" spc="-1" strike="noStrike">
               <a:latin typeface="Arial"/>
             </a:endParaRPr>
           </a:p>
@@ -856,7 +2177,7 @@
       </p:grpSpPr>
       <p:sp>
         <p:nvSpPr>
-          <p:cNvPr id="13" name="PlaceHolder 1"/>
+          <p:cNvPr id="10" name="PlaceHolder 1"/>
           <p:cNvSpPr>
             <a:spLocks noGrp="1"/>
           </p:cNvSpPr>
@@ -867,7 +2188,7 @@
         <p:spPr>
           <a:xfrm>
             <a:off x="504000" y="216000"/>
-            <a:ext cx="7020000" cy="936000"/>
+            <a:ext cx="7019640" cy="935640"/>
           </a:xfrm>
           <a:prstGeom prst="rect">
             <a:avLst/>
@@ -876,10 +2197,8 @@
         <p:txBody>
           <a:bodyPr lIns="0" rIns="0" tIns="0" bIns="0" anchor="ctr"/>
           <a:p>
-            <a:endParaRPr b="0" lang="en-IN" sz="3570" spc="-1" strike="noStrike">
-              <a:solidFill>
-                <a:srgbClr val="ffffff"/>
-              </a:solidFill>
+            <a:pPr algn="ctr"/>
+            <a:endParaRPr b="0" lang="en-IN" sz="4400" spc="-1" strike="noStrike">
               <a:latin typeface="Arial"/>
             </a:endParaRPr>
           </a:p>
@@ -909,7 +2228,7 @@
       </p:grpSpPr>
       <p:sp>
         <p:nvSpPr>
-          <p:cNvPr id="14" name="PlaceHolder 1"/>
+          <p:cNvPr id="11" name="PlaceHolder 1"/>
           <p:cNvSpPr>
             <a:spLocks noGrp="1"/>
           </p:cNvSpPr>
@@ -920,7 +2239,7 @@
         <p:spPr>
           <a:xfrm>
             <a:off x="504000" y="216000"/>
-            <a:ext cx="7020000" cy="4340160"/>
+            <a:ext cx="7019640" cy="4338360"/>
           </a:xfrm>
           <a:prstGeom prst="rect">
             <a:avLst/>
@@ -960,7 +2279,7 @@
       </p:grpSpPr>
       <p:sp>
         <p:nvSpPr>
-          <p:cNvPr id="15" name="PlaceHolder 1"/>
+          <p:cNvPr id="12" name="PlaceHolder 1"/>
           <p:cNvSpPr>
             <a:spLocks noGrp="1"/>
           </p:cNvSpPr>
@@ -971,7 +2290,7 @@
         <p:spPr>
           <a:xfrm>
             <a:off x="504000" y="216000"/>
-            <a:ext cx="7020000" cy="936000"/>
+            <a:ext cx="7019640" cy="935640"/>
           </a:xfrm>
           <a:prstGeom prst="rect">
             <a:avLst/>
@@ -980,18 +2299,16 @@
         <p:txBody>
           <a:bodyPr lIns="0" rIns="0" tIns="0" bIns="0" anchor="ctr"/>
           <a:p>
-            <a:endParaRPr b="0" lang="en-IN" sz="3570" spc="-1" strike="noStrike">
-              <a:solidFill>
-                <a:srgbClr val="ffffff"/>
-              </a:solidFill>
-              <a:latin typeface="Arial"/>
-            </a:endParaRPr>
-          </a:p>
-        </p:txBody>
-      </p:sp>
-      <p:sp>
-        <p:nvSpPr>
-          <p:cNvPr id="16" name="PlaceHolder 2"/>
+            <a:pPr algn="ctr"/>
+            <a:endParaRPr b="0" lang="en-IN" sz="4400" spc="-1" strike="noStrike">
+              <a:latin typeface="Arial"/>
+            </a:endParaRPr>
+          </a:p>
+        </p:txBody>
+      </p:sp>
+      <p:sp>
+        <p:nvSpPr>
+          <p:cNvPr id="13" name="PlaceHolder 2"/>
           <p:cNvSpPr>
             <a:spLocks noGrp="1"/>
           </p:cNvSpPr>
@@ -1013,15 +2330,15 @@
             <a:normAutofit/>
           </a:bodyPr>
           <a:p>
-            <a:endParaRPr b="0" lang="en-IN" sz="2600" spc="-1" strike="noStrike">
-              <a:latin typeface="Arial"/>
-            </a:endParaRPr>
-          </a:p>
-        </p:txBody>
-      </p:sp>
-      <p:sp>
-        <p:nvSpPr>
-          <p:cNvPr id="17" name="PlaceHolder 3"/>
+            <a:endParaRPr b="0" lang="en-IN" sz="3200" spc="-1" strike="noStrike">
+              <a:latin typeface="Arial"/>
+            </a:endParaRPr>
+          </a:p>
+        </p:txBody>
+      </p:sp>
+      <p:sp>
+        <p:nvSpPr>
+          <p:cNvPr id="14" name="PlaceHolder 3"/>
           <p:cNvSpPr>
             <a:spLocks noGrp="1"/>
           </p:cNvSpPr>
@@ -1032,26 +2349,26 @@
         <p:spPr>
           <a:xfrm>
             <a:off x="5152680" y="1368000"/>
-            <a:ext cx="4426920" cy="3288240"/>
-          </a:xfrm>
-          <a:prstGeom prst="rect">
-            <a:avLst/>
-          </a:prstGeom>
-        </p:spPr>
-        <p:txBody>
-          <a:bodyPr lIns="0" rIns="0" tIns="0" bIns="0">
-            <a:normAutofit/>
-          </a:bodyPr>
-          <a:p>
-            <a:endParaRPr b="0" lang="en-IN" sz="2600" spc="-1" strike="noStrike">
-              <a:latin typeface="Arial"/>
-            </a:endParaRPr>
-          </a:p>
-        </p:txBody>
-      </p:sp>
-      <p:sp>
-        <p:nvSpPr>
-          <p:cNvPr id="18" name="PlaceHolder 4"/>
+            <a:ext cx="4426920" cy="3287880"/>
+          </a:xfrm>
+          <a:prstGeom prst="rect">
+            <a:avLst/>
+          </a:prstGeom>
+        </p:spPr>
+        <p:txBody>
+          <a:bodyPr lIns="0" rIns="0" tIns="0" bIns="0">
+            <a:normAutofit/>
+          </a:bodyPr>
+          <a:p>
+            <a:endParaRPr b="0" lang="en-IN" sz="3200" spc="-1" strike="noStrike">
+              <a:latin typeface="Arial"/>
+            </a:endParaRPr>
+          </a:p>
+        </p:txBody>
+      </p:sp>
+      <p:sp>
+        <p:nvSpPr>
+          <p:cNvPr id="15" name="PlaceHolder 4"/>
           <p:cNvSpPr>
             <a:spLocks noGrp="1"/>
           </p:cNvSpPr>
@@ -1073,7 +2390,7 @@
             <a:normAutofit/>
           </a:bodyPr>
           <a:p>
-            <a:endParaRPr b="0" lang="en-IN" sz="2600" spc="-1" strike="noStrike">
+            <a:endParaRPr b="0" lang="en-IN" sz="3200" spc="-1" strike="noStrike">
               <a:latin typeface="Arial"/>
             </a:endParaRPr>
           </a:p>
@@ -1103,7 +2420,7 @@
       </p:grpSpPr>
       <p:sp>
         <p:nvSpPr>
-          <p:cNvPr id="19" name="PlaceHolder 1"/>
+          <p:cNvPr id="16" name="PlaceHolder 1"/>
           <p:cNvSpPr>
             <a:spLocks noGrp="1"/>
           </p:cNvSpPr>
@@ -1114,7 +2431,7 @@
         <p:spPr>
           <a:xfrm>
             <a:off x="504000" y="216000"/>
-            <a:ext cx="7020000" cy="936000"/>
+            <a:ext cx="7019640" cy="935640"/>
           </a:xfrm>
           <a:prstGeom prst="rect">
             <a:avLst/>
@@ -1123,18 +2440,16 @@
         <p:txBody>
           <a:bodyPr lIns="0" rIns="0" tIns="0" bIns="0" anchor="ctr"/>
           <a:p>
-            <a:endParaRPr b="0" lang="en-IN" sz="3570" spc="-1" strike="noStrike">
-              <a:solidFill>
-                <a:srgbClr val="ffffff"/>
-              </a:solidFill>
-              <a:latin typeface="Arial"/>
-            </a:endParaRPr>
-          </a:p>
-        </p:txBody>
-      </p:sp>
-      <p:sp>
-        <p:nvSpPr>
-          <p:cNvPr id="20" name="PlaceHolder 2"/>
+            <a:pPr algn="ctr"/>
+            <a:endParaRPr b="0" lang="en-IN" sz="4400" spc="-1" strike="noStrike">
+              <a:latin typeface="Arial"/>
+            </a:endParaRPr>
+          </a:p>
+        </p:txBody>
+      </p:sp>
+      <p:sp>
+        <p:nvSpPr>
+          <p:cNvPr id="17" name="PlaceHolder 2"/>
           <p:cNvSpPr>
             <a:spLocks noGrp="1"/>
           </p:cNvSpPr>
@@ -1145,26 +2460,26 @@
         <p:spPr>
           <a:xfrm>
             <a:off x="504000" y="1368000"/>
-            <a:ext cx="4426920" cy="3288240"/>
-          </a:xfrm>
-          <a:prstGeom prst="rect">
-            <a:avLst/>
-          </a:prstGeom>
-        </p:spPr>
-        <p:txBody>
-          <a:bodyPr lIns="0" rIns="0" tIns="0" bIns="0">
-            <a:normAutofit/>
-          </a:bodyPr>
-          <a:p>
-            <a:endParaRPr b="0" lang="en-IN" sz="2600" spc="-1" strike="noStrike">
-              <a:latin typeface="Arial"/>
-            </a:endParaRPr>
-          </a:p>
-        </p:txBody>
-      </p:sp>
-      <p:sp>
-        <p:nvSpPr>
-          <p:cNvPr id="21" name="PlaceHolder 3"/>
+            <a:ext cx="4426920" cy="3287880"/>
+          </a:xfrm>
+          <a:prstGeom prst="rect">
+            <a:avLst/>
+          </a:prstGeom>
+        </p:spPr>
+        <p:txBody>
+          <a:bodyPr lIns="0" rIns="0" tIns="0" bIns="0">
+            <a:normAutofit/>
+          </a:bodyPr>
+          <a:p>
+            <a:endParaRPr b="0" lang="en-IN" sz="3200" spc="-1" strike="noStrike">
+              <a:latin typeface="Arial"/>
+            </a:endParaRPr>
+          </a:p>
+        </p:txBody>
+      </p:sp>
+      <p:sp>
+        <p:nvSpPr>
+          <p:cNvPr id="18" name="PlaceHolder 3"/>
           <p:cNvSpPr>
             <a:spLocks noGrp="1"/>
           </p:cNvSpPr>
@@ -1186,15 +2501,15 @@
             <a:normAutofit/>
           </a:bodyPr>
           <a:p>
-            <a:endParaRPr b="0" lang="en-IN" sz="2600" spc="-1" strike="noStrike">
-              <a:latin typeface="Arial"/>
-            </a:endParaRPr>
-          </a:p>
-        </p:txBody>
-      </p:sp>
-      <p:sp>
-        <p:nvSpPr>
-          <p:cNvPr id="22" name="PlaceHolder 4"/>
+            <a:endParaRPr b="0" lang="en-IN" sz="3200" spc="-1" strike="noStrike">
+              <a:latin typeface="Arial"/>
+            </a:endParaRPr>
+          </a:p>
+        </p:txBody>
+      </p:sp>
+      <p:sp>
+        <p:nvSpPr>
+          <p:cNvPr id="19" name="PlaceHolder 4"/>
           <p:cNvSpPr>
             <a:spLocks noGrp="1"/>
           </p:cNvSpPr>
@@ -1216,7 +2531,7 @@
             <a:normAutofit/>
           </a:bodyPr>
           <a:p>
-            <a:endParaRPr b="0" lang="en-IN" sz="2600" spc="-1" strike="noStrike">
+            <a:endParaRPr b="0" lang="en-IN" sz="3200" spc="-1" strike="noStrike">
               <a:latin typeface="Arial"/>
             </a:endParaRPr>
           </a:p>
@@ -1246,7 +2561,7 @@
       </p:grpSpPr>
       <p:sp>
         <p:nvSpPr>
-          <p:cNvPr id="23" name="PlaceHolder 1"/>
+          <p:cNvPr id="20" name="PlaceHolder 1"/>
           <p:cNvSpPr>
             <a:spLocks noGrp="1"/>
           </p:cNvSpPr>
@@ -1257,7 +2572,7 @@
         <p:spPr>
           <a:xfrm>
             <a:off x="504000" y="216000"/>
-            <a:ext cx="7020000" cy="936000"/>
+            <a:ext cx="7019640" cy="935640"/>
           </a:xfrm>
           <a:prstGeom prst="rect">
             <a:avLst/>
@@ -1266,18 +2581,16 @@
         <p:txBody>
           <a:bodyPr lIns="0" rIns="0" tIns="0" bIns="0" anchor="ctr"/>
           <a:p>
-            <a:endParaRPr b="0" lang="en-IN" sz="3570" spc="-1" strike="noStrike">
-              <a:solidFill>
-                <a:srgbClr val="ffffff"/>
-              </a:solidFill>
-              <a:latin typeface="Arial"/>
-            </a:endParaRPr>
-          </a:p>
-        </p:txBody>
-      </p:sp>
-      <p:sp>
-        <p:nvSpPr>
-          <p:cNvPr id="24" name="PlaceHolder 2"/>
+            <a:pPr algn="ctr"/>
+            <a:endParaRPr b="0" lang="en-IN" sz="4400" spc="-1" strike="noStrike">
+              <a:latin typeface="Arial"/>
+            </a:endParaRPr>
+          </a:p>
+        </p:txBody>
+      </p:sp>
+      <p:sp>
+        <p:nvSpPr>
+          <p:cNvPr id="21" name="PlaceHolder 2"/>
           <p:cNvSpPr>
             <a:spLocks noGrp="1"/>
           </p:cNvSpPr>
@@ -1299,15 +2612,15 @@
             <a:normAutofit/>
           </a:bodyPr>
           <a:p>
-            <a:endParaRPr b="0" lang="en-IN" sz="2600" spc="-1" strike="noStrike">
-              <a:latin typeface="Arial"/>
-            </a:endParaRPr>
-          </a:p>
-        </p:txBody>
-      </p:sp>
-      <p:sp>
-        <p:nvSpPr>
-          <p:cNvPr id="25" name="PlaceHolder 3"/>
+            <a:endParaRPr b="0" lang="en-IN" sz="3200" spc="-1" strike="noStrike">
+              <a:latin typeface="Arial"/>
+            </a:endParaRPr>
+          </a:p>
+        </p:txBody>
+      </p:sp>
+      <p:sp>
+        <p:nvSpPr>
+          <p:cNvPr id="22" name="PlaceHolder 3"/>
           <p:cNvSpPr>
             <a:spLocks noGrp="1"/>
           </p:cNvSpPr>
@@ -1329,15 +2642,15 @@
             <a:normAutofit/>
           </a:bodyPr>
           <a:p>
-            <a:endParaRPr b="0" lang="en-IN" sz="2600" spc="-1" strike="noStrike">
-              <a:latin typeface="Arial"/>
-            </a:endParaRPr>
-          </a:p>
-        </p:txBody>
-      </p:sp>
-      <p:sp>
-        <p:nvSpPr>
-          <p:cNvPr id="26" name="PlaceHolder 4"/>
+            <a:endParaRPr b="0" lang="en-IN" sz="3200" spc="-1" strike="noStrike">
+              <a:latin typeface="Arial"/>
+            </a:endParaRPr>
+          </a:p>
+        </p:txBody>
+      </p:sp>
+      <p:sp>
+        <p:nvSpPr>
+          <p:cNvPr id="23" name="PlaceHolder 4"/>
           <p:cNvSpPr>
             <a:spLocks noGrp="1"/>
           </p:cNvSpPr>
@@ -1348,18 +2661,18 @@
         <p:spPr>
           <a:xfrm>
             <a:off x="504000" y="3085560"/>
-            <a:ext cx="9072000" cy="1568160"/>
-          </a:xfrm>
-          <a:prstGeom prst="rect">
-            <a:avLst/>
-          </a:prstGeom>
-        </p:spPr>
-        <p:txBody>
-          <a:bodyPr lIns="0" rIns="0" tIns="0" bIns="0">
-            <a:normAutofit/>
-          </a:bodyPr>
-          <a:p>
-            <a:endParaRPr b="0" lang="en-IN" sz="2600" spc="-1" strike="noStrike">
+            <a:ext cx="9071640" cy="1568160"/>
+          </a:xfrm>
+          <a:prstGeom prst="rect">
+            <a:avLst/>
+          </a:prstGeom>
+        </p:spPr>
+        <p:txBody>
+          <a:bodyPr lIns="0" rIns="0" tIns="0" bIns="0">
+            <a:normAutofit/>
+          </a:bodyPr>
+          <a:p>
+            <a:endParaRPr b="0" lang="en-IN" sz="3200" spc="-1" strike="noStrike">
               <a:latin typeface="Arial"/>
             </a:endParaRPr>
           </a:p>
@@ -1400,7 +2713,7 @@
         <p:spPr>
           <a:xfrm>
             <a:off x="-58320" y="81000"/>
-            <a:ext cx="7794360" cy="1205640"/>
+            <a:ext cx="7794000" cy="1205280"/>
           </a:xfrm>
           <a:prstGeom prst="rect">
             <a:avLst/>
@@ -1423,7 +2736,7 @@
         <p:spPr>
           <a:xfrm>
             <a:off x="504000" y="216000"/>
-            <a:ext cx="7020000" cy="936000"/>
+            <a:ext cx="7019640" cy="935640"/>
           </a:xfrm>
           <a:prstGeom prst="rect">
             <a:avLst/>
@@ -1433,18 +2746,12 @@
           <a:bodyPr lIns="0" rIns="0" tIns="0" bIns="0" anchor="ctr"/>
           <a:p>
             <a:r>
-              <a:rPr b="0" lang="en-IN" sz="3570" spc="-1" strike="noStrike">
-                <a:solidFill>
-                  <a:srgbClr val="ffffff"/>
-                </a:solidFill>
+              <a:rPr b="0" lang="en-IN" sz="1800" spc="-1" strike="noStrike">
                 <a:latin typeface="Arial"/>
               </a:rPr>
               <a:t>Click to edit the title text format</a:t>
             </a:r>
-            <a:endParaRPr b="0" lang="en-IN" sz="3570" spc="-1" strike="noStrike">
-              <a:solidFill>
-                <a:srgbClr val="ffffff"/>
-              </a:solidFill>
+            <a:endParaRPr b="0" lang="en-IN" sz="1800" spc="-1" strike="noStrike">
               <a:latin typeface="Arial"/>
             </a:endParaRPr>
           </a:p>
@@ -1462,8 +2769,8 @@
         </p:nvSpPr>
         <p:spPr>
           <a:xfrm>
-            <a:off x="504000" y="1368000"/>
-            <a:ext cx="9072000" cy="3288240"/>
+            <a:off x="504000" y="1326600"/>
+            <a:ext cx="9072000" cy="3288600"/>
           </a:xfrm>
           <a:prstGeom prst="rect">
             <a:avLst/>
@@ -1475,9 +2782,9 @@
           </a:bodyPr>
           <a:p>
             <a:pPr marL="432000" indent="-324000">
-              <a:spcAft>
-                <a:spcPts val="1148"/>
-              </a:spcAft>
+              <a:spcBef>
+                <a:spcPts val="1417"/>
+              </a:spcBef>
               <a:buClr>
                 <a:srgbClr val="000000"/>
               </a:buClr>
@@ -1486,20 +2793,20 @@
               <a:buChar char=""/>
             </a:pPr>
             <a:r>
-              <a:rPr b="0" lang="en-IN" sz="2600" spc="-1" strike="noStrike">
+              <a:rPr b="0" lang="en-IN" sz="3200" spc="-1" strike="noStrike">
                 <a:latin typeface="Arial"/>
               </a:rPr>
               <a:t>Click to edit the outline text format</a:t>
             </a:r>
-            <a:endParaRPr b="0" lang="en-IN" sz="2600" spc="-1" strike="noStrike">
+            <a:endParaRPr b="0" lang="en-IN" sz="3200" spc="-1" strike="noStrike">
               <a:latin typeface="Arial"/>
             </a:endParaRPr>
           </a:p>
           <a:p>
             <a:pPr lvl="1" marL="864000" indent="-324000">
-              <a:spcAft>
-                <a:spcPts val="918"/>
-              </a:spcAft>
+              <a:spcBef>
+                <a:spcPts val="1134"/>
+              </a:spcBef>
               <a:buClr>
                 <a:srgbClr val="000000"/>
               </a:buClr>
@@ -1508,20 +2815,20 @@
               <a:buChar char=""/>
             </a:pPr>
             <a:r>
-              <a:rPr b="0" lang="en-IN" sz="2280" spc="-1" strike="noStrike">
+              <a:rPr b="0" lang="en-IN" sz="2800" spc="-1" strike="noStrike">
                 <a:latin typeface="Arial"/>
               </a:rPr>
               <a:t>Second Outline Level</a:t>
             </a:r>
-            <a:endParaRPr b="0" lang="en-IN" sz="2280" spc="-1" strike="noStrike">
+            <a:endParaRPr b="0" lang="en-IN" sz="2800" spc="-1" strike="noStrike">
               <a:latin typeface="Arial"/>
             </a:endParaRPr>
           </a:p>
           <a:p>
             <a:pPr lvl="2" marL="1296000" indent="-288000">
-              <a:spcAft>
-                <a:spcPts val="689"/>
-              </a:spcAft>
+              <a:spcBef>
+                <a:spcPts val="850"/>
+              </a:spcBef>
               <a:buClr>
                 <a:srgbClr val="000000"/>
               </a:buClr>
@@ -1530,20 +2837,20 @@
               <a:buChar char=""/>
             </a:pPr>
             <a:r>
-              <a:rPr b="0" lang="en-IN" sz="1950" spc="-1" strike="noStrike">
+              <a:rPr b="0" lang="en-IN" sz="2400" spc="-1" strike="noStrike">
                 <a:latin typeface="Arial"/>
               </a:rPr>
               <a:t>Third Outline Level</a:t>
             </a:r>
-            <a:endParaRPr b="0" lang="en-IN" sz="1950" spc="-1" strike="noStrike">
+            <a:endParaRPr b="0" lang="en-IN" sz="2400" spc="-1" strike="noStrike">
               <a:latin typeface="Arial"/>
             </a:endParaRPr>
           </a:p>
           <a:p>
             <a:pPr lvl="3" marL="1728000" indent="-216000">
-              <a:spcAft>
-                <a:spcPts val="459"/>
-              </a:spcAft>
+              <a:spcBef>
+                <a:spcPts val="567"/>
+              </a:spcBef>
               <a:buClr>
                 <a:srgbClr val="000000"/>
               </a:buClr>
@@ -1552,20 +2859,20 @@
               <a:buChar char=""/>
             </a:pPr>
             <a:r>
-              <a:rPr b="0" lang="en-IN" sz="1629" spc="-1" strike="noStrike">
+              <a:rPr b="0" lang="en-IN" sz="2000" spc="-1" strike="noStrike">
                 <a:latin typeface="Arial"/>
               </a:rPr>
               <a:t>Fourth Outline Level</a:t>
             </a:r>
-            <a:endParaRPr b="0" lang="en-IN" sz="1629" spc="-1" strike="noStrike">
+            <a:endParaRPr b="0" lang="en-IN" sz="2000" spc="-1" strike="noStrike">
               <a:latin typeface="Arial"/>
             </a:endParaRPr>
           </a:p>
           <a:p>
             <a:pPr lvl="4" marL="2160000" indent="-216000">
-              <a:spcAft>
-                <a:spcPts val="230"/>
-              </a:spcAft>
+              <a:spcBef>
+                <a:spcPts val="283"/>
+              </a:spcBef>
               <a:buClr>
                 <a:srgbClr val="000000"/>
               </a:buClr>
@@ -1574,20 +2881,20 @@
               <a:buChar char=""/>
             </a:pPr>
             <a:r>
-              <a:rPr b="0" lang="en-IN" sz="1629" spc="-1" strike="noStrike">
+              <a:rPr b="0" lang="en-IN" sz="2000" spc="-1" strike="noStrike">
                 <a:latin typeface="Arial"/>
               </a:rPr>
               <a:t>Fifth Outline Level</a:t>
             </a:r>
-            <a:endParaRPr b="0" lang="en-IN" sz="1629" spc="-1" strike="noStrike">
+            <a:endParaRPr b="0" lang="en-IN" sz="2000" spc="-1" strike="noStrike">
               <a:latin typeface="Arial"/>
             </a:endParaRPr>
           </a:p>
           <a:p>
             <a:pPr lvl="5" marL="2592000" indent="-216000">
-              <a:spcAft>
-                <a:spcPts val="230"/>
-              </a:spcAft>
+              <a:spcBef>
+                <a:spcPts val="283"/>
+              </a:spcBef>
               <a:buClr>
                 <a:srgbClr val="000000"/>
               </a:buClr>
@@ -1596,20 +2903,20 @@
               <a:buChar char=""/>
             </a:pPr>
             <a:r>
-              <a:rPr b="0" lang="en-IN" sz="1629" spc="-1" strike="noStrike">
+              <a:rPr b="0" lang="en-IN" sz="2000" spc="-1" strike="noStrike">
                 <a:latin typeface="Arial"/>
               </a:rPr>
               <a:t>Sixth Outline Level</a:t>
             </a:r>
-            <a:endParaRPr b="0" lang="en-IN" sz="1629" spc="-1" strike="noStrike">
+            <a:endParaRPr b="0" lang="en-IN" sz="2000" spc="-1" strike="noStrike">
               <a:latin typeface="Arial"/>
             </a:endParaRPr>
           </a:p>
           <a:p>
             <a:pPr lvl="6" marL="3024000" indent="-216000">
-              <a:spcAft>
-                <a:spcPts val="230"/>
-              </a:spcAft>
+              <a:spcBef>
+                <a:spcPts val="283"/>
+              </a:spcBef>
               <a:buClr>
                 <a:srgbClr val="000000"/>
               </a:buClr>
@@ -1618,116 +2925,12 @@
               <a:buChar char=""/>
             </a:pPr>
             <a:r>
-              <a:rPr b="0" lang="en-IN" sz="1629" spc="-1" strike="noStrike">
+              <a:rPr b="0" lang="en-IN" sz="2000" spc="-1" strike="noStrike">
                 <a:latin typeface="Arial"/>
               </a:rPr>
               <a:t>Seventh Outline Level</a:t>
             </a:r>
-            <a:endParaRPr b="0" lang="en-IN" sz="1629" spc="-1" strike="noStrike">
-              <a:latin typeface="Arial"/>
-            </a:endParaRPr>
-          </a:p>
-        </p:txBody>
-      </p:sp>
-      <p:sp>
-        <p:nvSpPr>
-          <p:cNvPr id="3" name="PlaceHolder 3"/>
-          <p:cNvSpPr>
-            <a:spLocks noGrp="1"/>
-          </p:cNvSpPr>
-          <p:nvPr>
-            <p:ph type="dt"/>
-          </p:nvPr>
-        </p:nvSpPr>
-        <p:spPr>
-          <a:xfrm>
-            <a:off x="504000" y="5164920"/>
-            <a:ext cx="2348280" cy="390600"/>
-          </a:xfrm>
-          <a:prstGeom prst="rect">
-            <a:avLst/>
-          </a:prstGeom>
-        </p:spPr>
-        <p:txBody>
-          <a:bodyPr lIns="0" rIns="0" tIns="0" bIns="0"/>
-          <a:p>
-            <a:r>
-              <a:rPr b="0" lang="en-IN" sz="1400" spc="-1" strike="noStrike">
-                <a:latin typeface="Arial"/>
-              </a:rPr>
-              <a:t>&lt;date/time&gt;</a:t>
-            </a:r>
-            <a:endParaRPr b="0" lang="en-IN" sz="1400" spc="-1" strike="noStrike">
-              <a:latin typeface="Arial"/>
-            </a:endParaRPr>
-          </a:p>
-        </p:txBody>
-      </p:sp>
-      <p:sp>
-        <p:nvSpPr>
-          <p:cNvPr id="4" name="PlaceHolder 4"/>
-          <p:cNvSpPr>
-            <a:spLocks noGrp="1"/>
-          </p:cNvSpPr>
-          <p:nvPr>
-            <p:ph type="ftr"/>
-          </p:nvPr>
-        </p:nvSpPr>
-        <p:spPr>
-          <a:xfrm>
-            <a:off x="3447000" y="5164920"/>
-            <a:ext cx="3195000" cy="390600"/>
-          </a:xfrm>
-          <a:prstGeom prst="rect">
-            <a:avLst/>
-          </a:prstGeom>
-        </p:spPr>
-        <p:txBody>
-          <a:bodyPr lIns="0" rIns="0" tIns="0" bIns="0"/>
-          <a:p>
-            <a:pPr algn="ctr"/>
-            <a:r>
-              <a:rPr b="0" lang="en-IN" sz="1400" spc="-1" strike="noStrike">
-                <a:latin typeface="Arial"/>
-              </a:rPr>
-              <a:t>&lt;footer&gt;</a:t>
-            </a:r>
-            <a:endParaRPr b="0" lang="en-IN" sz="1400" spc="-1" strike="noStrike">
-              <a:latin typeface="Arial"/>
-            </a:endParaRPr>
-          </a:p>
-        </p:txBody>
-      </p:sp>
-      <p:sp>
-        <p:nvSpPr>
-          <p:cNvPr id="5" name="PlaceHolder 5"/>
-          <p:cNvSpPr>
-            <a:spLocks noGrp="1"/>
-          </p:cNvSpPr>
-          <p:nvPr>
-            <p:ph type="sldNum"/>
-          </p:nvPr>
-        </p:nvSpPr>
-        <p:spPr>
-          <a:xfrm>
-            <a:off x="7227000" y="5164920"/>
-            <a:ext cx="2348280" cy="390600"/>
-          </a:xfrm>
-          <a:prstGeom prst="rect">
-            <a:avLst/>
-          </a:prstGeom>
-        </p:spPr>
-        <p:txBody>
-          <a:bodyPr lIns="0" rIns="0" tIns="0" bIns="0"/>
-          <a:p>
-            <a:pPr algn="r"/>
-            <a:fld id="{8B327006-6B7B-46FD-B9B8-4AFF5A0C3B22}" type="slidenum">
-              <a:rPr b="0" lang="en-IN" sz="1400" spc="-1" strike="noStrike">
-                <a:latin typeface="Arial"/>
-              </a:rPr>
-              <a:t>&lt;number&gt;</a:t>
-            </a:fld>
-            <a:endParaRPr b="0" lang="en-IN" sz="1400" spc="-1" strike="noStrike">
+            <a:endParaRPr b="0" lang="en-IN" sz="2000" spc="-1" strike="noStrike">
               <a:latin typeface="Arial"/>
             </a:endParaRPr>
           </a:p>
@@ -1749,6 +2952,279 @@
     <p:sldLayoutId id="2147483658" r:id="rId12"/>
     <p:sldLayoutId id="2147483659" r:id="rId13"/>
     <p:sldLayoutId id="2147483660" r:id="rId14"/>
+  </p:sldLayoutIdLst>
+</p:sldMaster>
+</file>
+
+<file path=ppt/slideMasters/slideMaster2.xml><?xml version="1.0" encoding="utf-8"?>
+<p:sldMaster xmlns:a="http://schemas.openxmlformats.org/drawingml/2006/main" xmlns:p="http://schemas.openxmlformats.org/presentationml/2006/main" xmlns:r="http://schemas.openxmlformats.org/officeDocument/2006/relationships" xmlns:p14="http://schemas.microsoft.com/office/powerpoint/2010/main" xmlns:p15="http://schemas.microsoft.com/office/powerpoint/2012/main" xmlns:mc="http://schemas.openxmlformats.org/markup-compatibility/2006">
+  <p:cSld>
+    <p:spTree>
+      <p:nvGrpSpPr>
+        <p:cNvPr id="1" name=""/>
+        <p:cNvGrpSpPr/>
+        <p:nvPr/>
+      </p:nvGrpSpPr>
+      <p:grpSpPr>
+        <a:xfrm>
+          <a:off x="0" y="0"/>
+          <a:ext cx="0" cy="0"/>
+          <a:chOff x="0" y="0"/>
+          <a:chExt cx="0" cy="0"/>
+        </a:xfrm>
+      </p:grpSpPr>
+      <p:pic>
+        <p:nvPicPr>
+          <p:cNvPr id="39" name="" descr=""/>
+          <p:cNvPicPr/>
+          <p:nvPr/>
+        </p:nvPicPr>
+        <p:blipFill>
+          <a:blip r:embed="rId2"/>
+          <a:stretch/>
+        </p:blipFill>
+        <p:spPr>
+          <a:xfrm>
+            <a:off x="-58320" y="81000"/>
+            <a:ext cx="7794000" cy="1205280"/>
+          </a:xfrm>
+          <a:prstGeom prst="rect">
+            <a:avLst/>
+          </a:prstGeom>
+          <a:ln>
+            <a:noFill/>
+          </a:ln>
+        </p:spPr>
+      </p:pic>
+      <p:sp>
+        <p:nvSpPr>
+          <p:cNvPr id="40" name="PlaceHolder 1"/>
+          <p:cNvSpPr>
+            <a:spLocks noGrp="1"/>
+          </p:cNvSpPr>
+          <p:nvPr>
+            <p:ph type="title"/>
+          </p:nvPr>
+        </p:nvSpPr>
+        <p:spPr>
+          <a:xfrm>
+            <a:off x="504000" y="216000"/>
+            <a:ext cx="7019640" cy="935640"/>
+          </a:xfrm>
+          <a:prstGeom prst="rect">
+            <a:avLst/>
+          </a:prstGeom>
+        </p:spPr>
+        <p:txBody>
+          <a:bodyPr lIns="0" rIns="0" tIns="0" bIns="0" anchor="ctr"/>
+          <a:p>
+            <a:r>
+              <a:rPr b="0" lang="en-IN" sz="1800" spc="-1" strike="noStrike">
+                <a:latin typeface="Arial"/>
+              </a:rPr>
+              <a:t>Click to edit the title text format</a:t>
+            </a:r>
+            <a:endParaRPr b="0" lang="en-IN" sz="1800" spc="-1" strike="noStrike">
+              <a:latin typeface="Arial"/>
+            </a:endParaRPr>
+          </a:p>
+        </p:txBody>
+      </p:sp>
+      <p:sp>
+        <p:nvSpPr>
+          <p:cNvPr id="41" name="PlaceHolder 2"/>
+          <p:cNvSpPr>
+            <a:spLocks noGrp="1"/>
+          </p:cNvSpPr>
+          <p:nvPr>
+            <p:ph type="body"/>
+          </p:nvPr>
+        </p:nvSpPr>
+        <p:spPr>
+          <a:xfrm>
+            <a:off x="504000" y="1368000"/>
+            <a:ext cx="9071640" cy="3287880"/>
+          </a:xfrm>
+          <a:prstGeom prst="rect">
+            <a:avLst/>
+          </a:prstGeom>
+        </p:spPr>
+        <p:txBody>
+          <a:bodyPr lIns="0" rIns="0" tIns="0" bIns="0">
+            <a:normAutofit/>
+          </a:bodyPr>
+          <a:p>
+            <a:pPr marL="432000" indent="-324000">
+              <a:spcBef>
+                <a:spcPts val="1417"/>
+              </a:spcBef>
+              <a:buClr>
+                <a:srgbClr val="000000"/>
+              </a:buClr>
+              <a:buSzPct val="45000"/>
+              <a:buFont typeface="Wingdings" charset="2"/>
+              <a:buChar char=""/>
+            </a:pPr>
+            <a:r>
+              <a:rPr b="0" lang="en-IN" sz="1800" spc="-1" strike="noStrike">
+                <a:latin typeface="Arial"/>
+              </a:rPr>
+              <a:t>Click to edit the outline text format</a:t>
+            </a:r>
+            <a:endParaRPr b="0" lang="en-IN" sz="1800" spc="-1" strike="noStrike">
+              <a:latin typeface="Arial"/>
+            </a:endParaRPr>
+          </a:p>
+          <a:p>
+            <a:pPr lvl="1" marL="864000" indent="-324000">
+              <a:spcBef>
+                <a:spcPts val="1134"/>
+              </a:spcBef>
+              <a:buClr>
+                <a:srgbClr val="000000"/>
+              </a:buClr>
+              <a:buSzPct val="75000"/>
+              <a:buFont typeface="Symbol" charset="2"/>
+              <a:buChar char=""/>
+            </a:pPr>
+            <a:r>
+              <a:rPr b="0" lang="en-IN" sz="1800" spc="-1" strike="noStrike">
+                <a:latin typeface="Arial"/>
+              </a:rPr>
+              <a:t>Second Outline Level</a:t>
+            </a:r>
+            <a:endParaRPr b="0" lang="en-IN" sz="1800" spc="-1" strike="noStrike">
+              <a:latin typeface="Arial"/>
+            </a:endParaRPr>
+          </a:p>
+          <a:p>
+            <a:pPr lvl="2" marL="1296000" indent="-288000">
+              <a:spcBef>
+                <a:spcPts val="850"/>
+              </a:spcBef>
+              <a:buClr>
+                <a:srgbClr val="000000"/>
+              </a:buClr>
+              <a:buSzPct val="45000"/>
+              <a:buFont typeface="Wingdings" charset="2"/>
+              <a:buChar char=""/>
+            </a:pPr>
+            <a:r>
+              <a:rPr b="0" lang="en-IN" sz="1800" spc="-1" strike="noStrike">
+                <a:latin typeface="Arial"/>
+              </a:rPr>
+              <a:t>Third Outline Level</a:t>
+            </a:r>
+            <a:endParaRPr b="0" lang="en-IN" sz="1800" spc="-1" strike="noStrike">
+              <a:latin typeface="Arial"/>
+            </a:endParaRPr>
+          </a:p>
+          <a:p>
+            <a:pPr lvl="3" marL="1728000" indent="-216000">
+              <a:spcBef>
+                <a:spcPts val="567"/>
+              </a:spcBef>
+              <a:buClr>
+                <a:srgbClr val="000000"/>
+              </a:buClr>
+              <a:buSzPct val="75000"/>
+              <a:buFont typeface="Symbol" charset="2"/>
+              <a:buChar char=""/>
+            </a:pPr>
+            <a:r>
+              <a:rPr b="0" lang="en-IN" sz="1800" spc="-1" strike="noStrike">
+                <a:latin typeface="Arial"/>
+              </a:rPr>
+              <a:t>Fourth Outline Level</a:t>
+            </a:r>
+            <a:endParaRPr b="0" lang="en-IN" sz="1800" spc="-1" strike="noStrike">
+              <a:latin typeface="Arial"/>
+            </a:endParaRPr>
+          </a:p>
+          <a:p>
+            <a:pPr lvl="4" marL="2160000" indent="-216000">
+              <a:spcBef>
+                <a:spcPts val="283"/>
+              </a:spcBef>
+              <a:buClr>
+                <a:srgbClr val="000000"/>
+              </a:buClr>
+              <a:buSzPct val="45000"/>
+              <a:buFont typeface="Wingdings" charset="2"/>
+              <a:buChar char=""/>
+            </a:pPr>
+            <a:r>
+              <a:rPr b="0" lang="en-IN" sz="1800" spc="-1" strike="noStrike">
+                <a:latin typeface="Arial"/>
+              </a:rPr>
+              <a:t>Fifth Outline Level</a:t>
+            </a:r>
+            <a:endParaRPr b="0" lang="en-IN" sz="1800" spc="-1" strike="noStrike">
+              <a:latin typeface="Arial"/>
+            </a:endParaRPr>
+          </a:p>
+          <a:p>
+            <a:pPr lvl="5" marL="2592000" indent="-216000">
+              <a:spcBef>
+                <a:spcPts val="283"/>
+              </a:spcBef>
+              <a:buClr>
+                <a:srgbClr val="000000"/>
+              </a:buClr>
+              <a:buSzPct val="45000"/>
+              <a:buFont typeface="Wingdings" charset="2"/>
+              <a:buChar char=""/>
+            </a:pPr>
+            <a:r>
+              <a:rPr b="0" lang="en-IN" sz="1800" spc="-1" strike="noStrike">
+                <a:latin typeface="Arial"/>
+              </a:rPr>
+              <a:t>Sixth Outline Level</a:t>
+            </a:r>
+            <a:endParaRPr b="0" lang="en-IN" sz="1800" spc="-1" strike="noStrike">
+              <a:latin typeface="Arial"/>
+            </a:endParaRPr>
+          </a:p>
+          <a:p>
+            <a:pPr lvl="6" marL="3024000" indent="-216000">
+              <a:spcBef>
+                <a:spcPts val="283"/>
+              </a:spcBef>
+              <a:buClr>
+                <a:srgbClr val="000000"/>
+              </a:buClr>
+              <a:buSzPct val="45000"/>
+              <a:buFont typeface="Wingdings" charset="2"/>
+              <a:buChar char=""/>
+            </a:pPr>
+            <a:r>
+              <a:rPr b="0" lang="en-IN" sz="1800" spc="-1" strike="noStrike">
+                <a:latin typeface="Arial"/>
+              </a:rPr>
+              <a:t>Seventh Outline Level</a:t>
+            </a:r>
+            <a:endParaRPr b="0" lang="en-IN" sz="1800" spc="-1" strike="noStrike">
+              <a:latin typeface="Arial"/>
+            </a:endParaRPr>
+          </a:p>
+        </p:txBody>
+      </p:sp>
+    </p:spTree>
+  </p:cSld>
+  <p:clrMap bg1="lt1" bg2="lt2" tx1="dk1" tx2="dk2" accent1="accent1" accent2="accent2" accent3="accent3" accent4="accent4" accent5="accent5" accent6="accent6" hlink="hlink" folHlink="folHlink"/>
+  <p:sldLayoutIdLst>
+    <p:sldLayoutId id="2147483662" r:id="rId3"/>
+    <p:sldLayoutId id="2147483663" r:id="rId4"/>
+    <p:sldLayoutId id="2147483664" r:id="rId5"/>
+    <p:sldLayoutId id="2147483665" r:id="rId6"/>
+    <p:sldLayoutId id="2147483666" r:id="rId7"/>
+    <p:sldLayoutId id="2147483667" r:id="rId8"/>
+    <p:sldLayoutId id="2147483668" r:id="rId9"/>
+    <p:sldLayoutId id="2147483669" r:id="rId10"/>
+    <p:sldLayoutId id="2147483670" r:id="rId11"/>
+    <p:sldLayoutId id="2147483671" r:id="rId12"/>
+    <p:sldLayoutId id="2147483672" r:id="rId13"/>
+    <p:sldLayoutId id="2147483673" r:id="rId14"/>
   </p:sldLayoutIdLst>
 </p:sldMaster>
 </file>
@@ -1772,14 +3248,14 @@
       </p:grpSpPr>
       <p:sp>
         <p:nvSpPr>
-          <p:cNvPr id="42" name="TextShape 1"/>
-          <p:cNvSpPr txBox="1"/>
+          <p:cNvPr id="78" name="CustomShape 1"/>
+          <p:cNvSpPr/>
           <p:nvPr/>
         </p:nvSpPr>
         <p:spPr>
           <a:xfrm>
             <a:off x="504000" y="216000"/>
-            <a:ext cx="7020000" cy="936000"/>
+            <a:ext cx="7019640" cy="935640"/>
           </a:xfrm>
           <a:prstGeom prst="rect">
             <a:avLst/>
@@ -1789,9 +3265,20 @@
             <a:noFill/>
           </a:ln>
         </p:spPr>
+        <p:style>
+          <a:lnRef idx="0"/>
+          <a:fillRef idx="0"/>
+          <a:effectRef idx="0"/>
+          <a:fontRef idx="minor"/>
+        </p:style>
         <p:txBody>
           <a:bodyPr lIns="0" rIns="0" tIns="0" bIns="0" anchor="ctr"/>
           <a:p>
+            <a:pPr>
+              <a:lnSpc>
+                <a:spcPct val="100000"/>
+              </a:lnSpc>
+            </a:pPr>
             <a:r>
               <a:rPr b="0" lang="en-IN" sz="3570" spc="-1" strike="noStrike">
                 <a:solidFill>
@@ -1802,24 +3289,21 @@
               <a:t>OWASP Top 10 Vulnerabilities</a:t>
             </a:r>
             <a:endParaRPr b="0" lang="en-IN" sz="3570" spc="-1" strike="noStrike">
-              <a:solidFill>
-                <a:srgbClr val="ffffff"/>
-              </a:solidFill>
-              <a:latin typeface="Arial"/>
-            </a:endParaRPr>
-          </a:p>
-        </p:txBody>
-      </p:sp>
-      <p:sp>
-        <p:nvSpPr>
-          <p:cNvPr id="43" name="TextShape 2"/>
-          <p:cNvSpPr txBox="1"/>
+              <a:latin typeface="Arial"/>
+            </a:endParaRPr>
+          </a:p>
+        </p:txBody>
+      </p:sp>
+      <p:sp>
+        <p:nvSpPr>
+          <p:cNvPr id="79" name="CustomShape 2"/>
+          <p:cNvSpPr/>
           <p:nvPr/>
         </p:nvSpPr>
         <p:spPr>
           <a:xfrm>
             <a:off x="504000" y="1368000"/>
-            <a:ext cx="9072000" cy="3288240"/>
+            <a:ext cx="9071640" cy="3287880"/>
           </a:xfrm>
           <a:prstGeom prst="rect">
             <a:avLst/>
@@ -1829,19 +3313,16 @@
             <a:noFill/>
           </a:ln>
         </p:spPr>
-        <p:txBody>
-          <a:bodyPr lIns="0" rIns="0" tIns="0" bIns="0" anchor="ctr"/>
-          <a:p>
-            <a:pPr algn="ctr"/>
-            <a:endParaRPr b="0" lang="en-IN" sz="3200" spc="-1" strike="noStrike">
-              <a:latin typeface="Arial"/>
-            </a:endParaRPr>
-          </a:p>
-        </p:txBody>
+        <p:style>
+          <a:lnRef idx="0"/>
+          <a:fillRef idx="0"/>
+          <a:effectRef idx="0"/>
+          <a:fontRef idx="minor"/>
+        </p:style>
       </p:sp>
       <p:pic>
         <p:nvPicPr>
-          <p:cNvPr id="44" name="" descr=""/>
+          <p:cNvPr id="80" name="" descr=""/>
           <p:cNvPicPr/>
           <p:nvPr/>
         </p:nvPicPr>
@@ -1852,7 +3333,7 @@
         <p:spPr>
           <a:xfrm>
             <a:off x="2778840" y="1299960"/>
-            <a:ext cx="5913000" cy="4028040"/>
+            <a:ext cx="5912640" cy="4027680"/>
           </a:xfrm>
           <a:prstGeom prst="rect">
             <a:avLst/>
@@ -1913,14 +3394,14 @@
       </p:grpSpPr>
       <p:sp>
         <p:nvSpPr>
-          <p:cNvPr id="45" name="TextShape 1"/>
-          <p:cNvSpPr txBox="1"/>
+          <p:cNvPr id="81" name="CustomShape 1"/>
+          <p:cNvSpPr/>
           <p:nvPr/>
         </p:nvSpPr>
         <p:spPr>
           <a:xfrm>
             <a:off x="504000" y="216000"/>
-            <a:ext cx="7020000" cy="936000"/>
+            <a:ext cx="7019640" cy="935640"/>
           </a:xfrm>
           <a:prstGeom prst="rect">
             <a:avLst/>
@@ -1930,9 +3411,20 @@
             <a:noFill/>
           </a:ln>
         </p:spPr>
+        <p:style>
+          <a:lnRef idx="0"/>
+          <a:fillRef idx="0"/>
+          <a:effectRef idx="0"/>
+          <a:fontRef idx="minor"/>
+        </p:style>
         <p:txBody>
           <a:bodyPr lIns="0" rIns="0" tIns="0" bIns="0" anchor="ctr"/>
           <a:p>
+            <a:pPr>
+              <a:lnSpc>
+                <a:spcPct val="100000"/>
+              </a:lnSpc>
+            </a:pPr>
             <a:r>
               <a:rPr b="0" lang="en-IN" sz="3570" spc="-1" strike="noStrike">
                 <a:solidFill>
@@ -1943,24 +3435,21 @@
               <a:t>Threat Model- XSRF</a:t>
             </a:r>
             <a:endParaRPr b="0" lang="en-IN" sz="3570" spc="-1" strike="noStrike">
-              <a:solidFill>
-                <a:srgbClr val="ffffff"/>
-              </a:solidFill>
-              <a:latin typeface="Arial"/>
-            </a:endParaRPr>
-          </a:p>
-        </p:txBody>
-      </p:sp>
-      <p:sp>
-        <p:nvSpPr>
-          <p:cNvPr id="46" name="TextShape 2"/>
-          <p:cNvSpPr txBox="1"/>
+              <a:latin typeface="Arial"/>
+            </a:endParaRPr>
+          </a:p>
+        </p:txBody>
+      </p:sp>
+      <p:sp>
+        <p:nvSpPr>
+          <p:cNvPr id="82" name="CustomShape 2"/>
+          <p:cNvSpPr/>
           <p:nvPr/>
         </p:nvSpPr>
         <p:spPr>
           <a:xfrm>
             <a:off x="504000" y="1368000"/>
-            <a:ext cx="9072000" cy="3288240"/>
+            <a:ext cx="9071640" cy="3287880"/>
           </a:xfrm>
           <a:prstGeom prst="rect">
             <a:avLst/>
@@ -1970,16 +3459,12 @@
             <a:noFill/>
           </a:ln>
         </p:spPr>
-        <p:txBody>
-          <a:bodyPr lIns="0" rIns="0" tIns="0" bIns="0">
-            <a:normAutofit/>
-          </a:bodyPr>
-          <a:p>
-            <a:endParaRPr b="0" lang="en-IN" sz="2600" spc="-1" strike="noStrike">
-              <a:latin typeface="Arial"/>
-            </a:endParaRPr>
-          </a:p>
-        </p:txBody>
+        <p:style>
+          <a:lnRef idx="0"/>
+          <a:fillRef idx="0"/>
+          <a:effectRef idx="0"/>
+          <a:fontRef idx="minor"/>
+        </p:style>
       </p:sp>
     </p:spTree>
   </p:cSld>
@@ -2032,14 +3517,14 @@
       </p:grpSpPr>
       <p:sp>
         <p:nvSpPr>
-          <p:cNvPr id="47" name="TextShape 1"/>
-          <p:cNvSpPr txBox="1"/>
+          <p:cNvPr id="83" name="CustomShape 1"/>
+          <p:cNvSpPr/>
           <p:nvPr/>
         </p:nvSpPr>
         <p:spPr>
           <a:xfrm>
             <a:off x="504000" y="216000"/>
-            <a:ext cx="7020000" cy="936000"/>
+            <a:ext cx="7019640" cy="935640"/>
           </a:xfrm>
           <a:prstGeom prst="rect">
             <a:avLst/>
@@ -2049,9 +3534,20 @@
             <a:noFill/>
           </a:ln>
         </p:spPr>
+        <p:style>
+          <a:lnRef idx="0"/>
+          <a:fillRef idx="0"/>
+          <a:effectRef idx="0"/>
+          <a:fontRef idx="minor"/>
+        </p:style>
         <p:txBody>
           <a:bodyPr lIns="0" rIns="0" tIns="0" bIns="0" anchor="ctr"/>
           <a:p>
+            <a:pPr>
+              <a:lnSpc>
+                <a:spcPct val="100000"/>
+              </a:lnSpc>
+            </a:pPr>
             <a:r>
               <a:rPr b="0" lang="en-IN" sz="3570" spc="-1" strike="noStrike">
                 <a:solidFill>
@@ -2062,24 +3558,21 @@
               <a:t>What is XSRF / CSRF</a:t>
             </a:r>
             <a:endParaRPr b="0" lang="en-IN" sz="3570" spc="-1" strike="noStrike">
-              <a:solidFill>
-                <a:srgbClr val="ffffff"/>
-              </a:solidFill>
-              <a:latin typeface="Arial"/>
-            </a:endParaRPr>
-          </a:p>
-        </p:txBody>
-      </p:sp>
-      <p:sp>
-        <p:nvSpPr>
-          <p:cNvPr id="48" name="TextShape 2"/>
-          <p:cNvSpPr txBox="1"/>
+              <a:latin typeface="Arial"/>
+            </a:endParaRPr>
+          </a:p>
+        </p:txBody>
+      </p:sp>
+      <p:sp>
+        <p:nvSpPr>
+          <p:cNvPr id="84" name="CustomShape 2"/>
+          <p:cNvSpPr/>
           <p:nvPr/>
         </p:nvSpPr>
         <p:spPr>
           <a:xfrm>
             <a:off x="504000" y="1368000"/>
-            <a:ext cx="9072000" cy="3288240"/>
+            <a:ext cx="9071640" cy="3287880"/>
           </a:xfrm>
           <a:prstGeom prst="rect">
             <a:avLst/>
@@ -2089,12 +3582,21 @@
             <a:noFill/>
           </a:ln>
         </p:spPr>
-        <p:txBody>
-          <a:bodyPr lIns="0" rIns="0" tIns="0" bIns="0">
-            <a:normAutofit/>
-          </a:bodyPr>
-          <a:p>
-            <a:pPr marL="432000" indent="-324000">
+        <p:style>
+          <a:lnRef idx="0"/>
+          <a:fillRef idx="0"/>
+          <a:effectRef idx="0"/>
+          <a:fontRef idx="minor"/>
+        </p:style>
+        <p:txBody>
+          <a:bodyPr lIns="0" rIns="0" tIns="0" bIns="0">
+            <a:normAutofit/>
+          </a:bodyPr>
+          <a:p>
+            <a:pPr marL="432000" indent="-323640">
+              <a:lnSpc>
+                <a:spcPct val="100000"/>
+              </a:lnSpc>
               <a:spcAft>
                 <a:spcPts val="1148"/>
               </a:spcAft>
@@ -2116,7 +3618,10 @@
             </a:endParaRPr>
           </a:p>
           <a:p>
-            <a:pPr marL="432000" indent="-324000">
+            <a:pPr marL="432000" indent="-323640">
+              <a:lnSpc>
+                <a:spcPct val="100000"/>
+              </a:lnSpc>
               <a:spcAft>
                 <a:spcPts val="1148"/>
               </a:spcAft>
@@ -2134,7 +3639,11 @@
               <a:t>Demo1 </a:t>
             </a:r>
             <a:r>
-              <a:rPr b="0" lang="en-IN" sz="2600" spc="-1" strike="noStrike">
+              <a:rPr b="0" lang="en-IN" sz="2600" spc="-1" strike="noStrike" u="sng">
+                <a:solidFill>
+                  <a:srgbClr val="0000ff"/>
+                </a:solidFill>
+                <a:uFillTx/>
                 <a:latin typeface="Arial"/>
                 <a:hlinkClick r:id="rId1"/>
               </a:rPr>
@@ -2145,7 +3654,10 @@
             </a:endParaRPr>
           </a:p>
           <a:p>
-            <a:pPr marL="432000" indent="-324000">
+            <a:pPr marL="432000" indent="-323640">
+              <a:lnSpc>
+                <a:spcPct val="100000"/>
+              </a:lnSpc>
               <a:spcAft>
                 <a:spcPts val="1148"/>
               </a:spcAft>
@@ -2158,12 +3670,19 @@
             </a:pPr>
             <a:r>
               <a:rPr b="0" lang="en-IN" sz="2600" spc="-1" strike="noStrike">
+                <a:solidFill>
+                  <a:srgbClr val="0000ff"/>
+                </a:solidFill>
                 <a:latin typeface="Arial"/>
               </a:rPr>
               <a:t>Demo2 </a:t>
             </a:r>
             <a:r>
-              <a:rPr b="0" lang="en-IN" sz="2600" spc="-1" strike="noStrike">
+              <a:rPr b="0" lang="en-IN" sz="2600" spc="-1" strike="noStrike" u="sng">
+                <a:solidFill>
+                  <a:srgbClr val="0000ff"/>
+                </a:solidFill>
+                <a:uFillTx/>
                 <a:latin typeface="Arial"/>
                 <a:hlinkClick r:id="rId2"/>
               </a:rPr>
@@ -2174,7 +3693,10 @@
             </a:endParaRPr>
           </a:p>
           <a:p>
-            <a:pPr marL="432000" indent="-324000">
+            <a:pPr marL="432000" indent="-323640">
+              <a:lnSpc>
+                <a:spcPct val="100000"/>
+              </a:lnSpc>
               <a:spcAft>
                 <a:spcPts val="1148"/>
               </a:spcAft>
@@ -2187,6 +3709,9 @@
             </a:pPr>
             <a:r>
               <a:rPr b="0" lang="en-IN" sz="2600" spc="-1" strike="noStrike">
+                <a:solidFill>
+                  <a:srgbClr val="0000ff"/>
+                </a:solidFill>
                 <a:latin typeface="Arial"/>
               </a:rPr>
               <a:t>How to prevent ?</a:t>
@@ -2196,7 +3721,10 @@
             </a:endParaRPr>
           </a:p>
           <a:p>
-            <a:pPr lvl="1" marL="864000" indent="-324000">
+            <a:pPr lvl="1" marL="864000" indent="-323640">
+              <a:lnSpc>
+                <a:spcPct val="100000"/>
+              </a:lnSpc>
               <a:spcAft>
                 <a:spcPts val="918"/>
               </a:spcAft>
@@ -2204,11 +3732,14 @@
                 <a:srgbClr val="000000"/>
               </a:buClr>
               <a:buSzPct val="75000"/>
-              <a:buFont typeface="Symbol" charset="2"/>
+              <a:buFont typeface="Symbol"/>
               <a:buChar char=""/>
             </a:pPr>
             <a:r>
               <a:rPr b="0" lang="en-IN" sz="2280" spc="-1" strike="noStrike">
+                <a:solidFill>
+                  <a:srgbClr val="0000ff"/>
+                </a:solidFill>
                 <a:latin typeface="Arial"/>
               </a:rPr>
               <a:t>XSRF Token</a:t>
@@ -2218,7 +3749,10 @@
             </a:endParaRPr>
           </a:p>
           <a:p>
-            <a:pPr lvl="1" marL="864000" indent="-324000">
+            <a:pPr lvl="1" marL="864000" indent="-323640">
+              <a:lnSpc>
+                <a:spcPct val="100000"/>
+              </a:lnSpc>
               <a:spcAft>
                 <a:spcPts val="918"/>
               </a:spcAft>
@@ -2226,11 +3760,14 @@
                 <a:srgbClr val="000000"/>
               </a:buClr>
               <a:buSzPct val="75000"/>
-              <a:buFont typeface="Symbol" charset="2"/>
+              <a:buFont typeface="Symbol"/>
               <a:buChar char=""/>
             </a:pPr>
             <a:r>
               <a:rPr b="0" lang="en-IN" sz="2280" spc="-1" strike="noStrike">
+                <a:solidFill>
+                  <a:srgbClr val="0000ff"/>
+                </a:solidFill>
                 <a:latin typeface="Arial"/>
               </a:rPr>
               <a:t>Server side transaction handling</a:t>
@@ -2292,14 +3829,14 @@
       </p:grpSpPr>
       <p:sp>
         <p:nvSpPr>
-          <p:cNvPr id="49" name="TextShape 1"/>
-          <p:cNvSpPr txBox="1"/>
+          <p:cNvPr id="85" name="CustomShape 1"/>
+          <p:cNvSpPr/>
           <p:nvPr/>
         </p:nvSpPr>
         <p:spPr>
           <a:xfrm>
             <a:off x="504000" y="177840"/>
-            <a:ext cx="7020000" cy="1012680"/>
+            <a:ext cx="7019640" cy="1012320"/>
           </a:xfrm>
           <a:prstGeom prst="rect">
             <a:avLst/>
@@ -2309,9 +3846,20 @@
             <a:noFill/>
           </a:ln>
         </p:spPr>
+        <p:style>
+          <a:lnRef idx="0"/>
+          <a:fillRef idx="0"/>
+          <a:effectRef idx="0"/>
+          <a:fontRef idx="minor"/>
+        </p:style>
         <p:txBody>
           <a:bodyPr lIns="0" rIns="0" tIns="0" bIns="0" anchor="ctr"/>
           <a:p>
+            <a:pPr>
+              <a:lnSpc>
+                <a:spcPct val="100000"/>
+              </a:lnSpc>
+            </a:pPr>
             <a:r>
               <a:rPr b="0" lang="en-IN" sz="3570" spc="-1" strike="noStrike">
                 <a:solidFill>
@@ -2322,24 +3870,21 @@
               <a:t>Insecure Direct Object Reference (IDOR) Attack</a:t>
             </a:r>
             <a:endParaRPr b="0" lang="en-IN" sz="3570" spc="-1" strike="noStrike">
-              <a:solidFill>
-                <a:srgbClr val="ffffff"/>
-              </a:solidFill>
-              <a:latin typeface="Arial"/>
-            </a:endParaRPr>
-          </a:p>
-        </p:txBody>
-      </p:sp>
-      <p:sp>
-        <p:nvSpPr>
-          <p:cNvPr id="50" name="TextShape 2"/>
-          <p:cNvSpPr txBox="1"/>
+              <a:latin typeface="Arial"/>
+            </a:endParaRPr>
+          </a:p>
+        </p:txBody>
+      </p:sp>
+      <p:sp>
+        <p:nvSpPr>
+          <p:cNvPr id="86" name="CustomShape 2"/>
+          <p:cNvSpPr/>
           <p:nvPr/>
         </p:nvSpPr>
         <p:spPr>
           <a:xfrm>
             <a:off x="504000" y="1368000"/>
-            <a:ext cx="9072000" cy="3288240"/>
+            <a:ext cx="9071640" cy="3287880"/>
           </a:xfrm>
           <a:prstGeom prst="rect">
             <a:avLst/>
@@ -2349,12 +3894,21 @@
             <a:noFill/>
           </a:ln>
         </p:spPr>
-        <p:txBody>
-          <a:bodyPr lIns="0" rIns="0" tIns="0" bIns="0">
-            <a:normAutofit/>
-          </a:bodyPr>
-          <a:p>
-            <a:pPr marL="432000" indent="-324000">
+        <p:style>
+          <a:lnRef idx="0"/>
+          <a:fillRef idx="0"/>
+          <a:effectRef idx="0"/>
+          <a:fontRef idx="minor"/>
+        </p:style>
+        <p:txBody>
+          <a:bodyPr lIns="0" rIns="0" tIns="0" bIns="0">
+            <a:normAutofit/>
+          </a:bodyPr>
+          <a:p>
+            <a:pPr marL="432000" indent="-323640">
+              <a:lnSpc>
+                <a:spcPct val="100000"/>
+              </a:lnSpc>
               <a:spcAft>
                 <a:spcPts val="1148"/>
               </a:spcAft>
@@ -2376,7 +3930,10 @@
             </a:endParaRPr>
           </a:p>
           <a:p>
-            <a:pPr marL="432000" indent="-324000">
+            <a:pPr marL="432000" indent="-323640">
+              <a:lnSpc>
+                <a:spcPct val="100000"/>
+              </a:lnSpc>
               <a:spcAft>
                 <a:spcPts val="1148"/>
               </a:spcAft>
@@ -2398,7 +3955,10 @@
             </a:endParaRPr>
           </a:p>
           <a:p>
-            <a:pPr marL="432000" indent="-324000">
+            <a:pPr marL="432000" indent="-323640">
+              <a:lnSpc>
+                <a:spcPct val="100000"/>
+              </a:lnSpc>
               <a:spcAft>
                 <a:spcPts val="1148"/>
               </a:spcAft>
@@ -2416,7 +3976,11 @@
               <a:t>Demo </a:t>
             </a:r>
             <a:r>
-              <a:rPr b="0" lang="en-IN" sz="2600" spc="-1" strike="noStrike">
+              <a:rPr b="0" lang="en-IN" sz="2600" spc="-1" strike="noStrike" u="sng">
+                <a:solidFill>
+                  <a:srgbClr val="0000ff"/>
+                </a:solidFill>
+                <a:uFillTx/>
                 <a:latin typeface="Arial"/>
                 <a:hlinkClick r:id="rId1"/>
               </a:rPr>
@@ -2479,14 +4043,14 @@
       </p:grpSpPr>
       <p:sp>
         <p:nvSpPr>
-          <p:cNvPr id="51" name="TextShape 1"/>
-          <p:cNvSpPr txBox="1"/>
+          <p:cNvPr id="87" name="CustomShape 1"/>
+          <p:cNvSpPr/>
           <p:nvPr/>
         </p:nvSpPr>
         <p:spPr>
           <a:xfrm>
             <a:off x="504000" y="216000"/>
-            <a:ext cx="7020000" cy="936000"/>
+            <a:ext cx="7019640" cy="935640"/>
           </a:xfrm>
           <a:prstGeom prst="rect">
             <a:avLst/>
@@ -2496,9 +4060,20 @@
             <a:noFill/>
           </a:ln>
         </p:spPr>
+        <p:style>
+          <a:lnRef idx="0"/>
+          <a:fillRef idx="0"/>
+          <a:effectRef idx="0"/>
+          <a:fontRef idx="minor"/>
+        </p:style>
         <p:txBody>
           <a:bodyPr lIns="0" rIns="0" tIns="0" bIns="0" anchor="ctr"/>
           <a:p>
+            <a:pPr>
+              <a:lnSpc>
+                <a:spcPct val="100000"/>
+              </a:lnSpc>
+            </a:pPr>
             <a:r>
               <a:rPr b="0" lang="en-IN" sz="3570" spc="-1" strike="noStrike">
                 <a:solidFill>
@@ -2509,24 +4084,21 @@
               <a:t>XXE attack</a:t>
             </a:r>
             <a:endParaRPr b="0" lang="en-IN" sz="3570" spc="-1" strike="noStrike">
-              <a:solidFill>
-                <a:srgbClr val="ffffff"/>
-              </a:solidFill>
-              <a:latin typeface="Arial"/>
-            </a:endParaRPr>
-          </a:p>
-        </p:txBody>
-      </p:sp>
-      <p:sp>
-        <p:nvSpPr>
-          <p:cNvPr id="52" name="TextShape 2"/>
-          <p:cNvSpPr txBox="1"/>
+              <a:latin typeface="Arial"/>
+            </a:endParaRPr>
+          </a:p>
+        </p:txBody>
+      </p:sp>
+      <p:sp>
+        <p:nvSpPr>
+          <p:cNvPr id="88" name="CustomShape 2"/>
+          <p:cNvSpPr/>
           <p:nvPr/>
         </p:nvSpPr>
         <p:spPr>
           <a:xfrm>
             <a:off x="504000" y="1368000"/>
-            <a:ext cx="9072000" cy="3288240"/>
+            <a:ext cx="9071640" cy="3287880"/>
           </a:xfrm>
           <a:prstGeom prst="rect">
             <a:avLst/>
@@ -2536,12 +4108,21 @@
             <a:noFill/>
           </a:ln>
         </p:spPr>
-        <p:txBody>
-          <a:bodyPr lIns="0" rIns="0" tIns="0" bIns="0">
-            <a:normAutofit/>
-          </a:bodyPr>
-          <a:p>
-            <a:pPr marL="432000" indent="-324000">
+        <p:style>
+          <a:lnRef idx="0"/>
+          <a:fillRef idx="0"/>
+          <a:effectRef idx="0"/>
+          <a:fontRef idx="minor"/>
+        </p:style>
+        <p:txBody>
+          <a:bodyPr lIns="0" rIns="0" tIns="0" bIns="0">
+            <a:normAutofit/>
+          </a:bodyPr>
+          <a:p>
+            <a:pPr marL="432000" indent="-323640">
+              <a:lnSpc>
+                <a:spcPct val="100000"/>
+              </a:lnSpc>
               <a:spcAft>
                 <a:spcPts val="1148"/>
               </a:spcAft>
@@ -2559,7 +4140,11 @@
               <a:t>Demo </a:t>
             </a:r>
             <a:r>
-              <a:rPr b="0" lang="en-IN" sz="2600" spc="-1" strike="noStrike">
+              <a:rPr b="0" lang="en-IN" sz="2600" spc="-1" strike="noStrike" u="sng">
+                <a:solidFill>
+                  <a:srgbClr val="0000ff"/>
+                </a:solidFill>
+                <a:uFillTx/>
                 <a:latin typeface="Arial"/>
                 <a:hlinkClick r:id="rId1"/>
               </a:rPr>
@@ -2570,7 +4155,10 @@
             </a:endParaRPr>
           </a:p>
           <a:p>
-            <a:pPr marL="432000" indent="-324000">
+            <a:pPr marL="432000" indent="-323640">
+              <a:lnSpc>
+                <a:spcPct val="100000"/>
+              </a:lnSpc>
               <a:spcAft>
                 <a:spcPts val="1148"/>
               </a:spcAft>
@@ -2583,12 +4171,19 @@
             </a:pPr>
             <a:r>
               <a:rPr b="0" lang="en-IN" sz="2600" spc="-1" strike="noStrike">
+                <a:solidFill>
+                  <a:srgbClr val="0000ff"/>
+                </a:solidFill>
                 <a:latin typeface="Arial"/>
               </a:rPr>
               <a:t>Also called Billion Laugh (Lol;) Attack </a:t>
             </a:r>
             <a:r>
-              <a:rPr b="0" lang="en-IN" sz="2600" spc="-1" strike="noStrike">
+              <a:rPr b="0" lang="en-IN" sz="2600" spc="-1" strike="noStrike" u="sng">
+                <a:solidFill>
+                  <a:srgbClr val="0000ff"/>
+                </a:solidFill>
+                <a:uFillTx/>
                 <a:latin typeface="Arial"/>
                 <a:hlinkClick r:id="rId2"/>
               </a:rPr>
@@ -2599,7 +4194,10 @@
             </a:endParaRPr>
           </a:p>
           <a:p>
-            <a:pPr marL="432000" indent="-324000">
+            <a:pPr marL="432000" indent="-323640">
+              <a:lnSpc>
+                <a:spcPct val="100000"/>
+              </a:lnSpc>
               <a:spcAft>
                 <a:spcPts val="1148"/>
               </a:spcAft>
@@ -2612,6 +4210,9 @@
             </a:pPr>
             <a:r>
               <a:rPr b="0" lang="en-IN" sz="2600" spc="-1" strike="noStrike">
+                <a:solidFill>
+                  <a:srgbClr val="0000ff"/>
+                </a:solidFill>
                 <a:latin typeface="Arial"/>
               </a:rPr>
               <a:t>YAML also has similar vulnerability</a:t>
@@ -2621,7 +4222,10 @@
             </a:endParaRPr>
           </a:p>
           <a:p>
-            <a:pPr marL="432000" indent="-324000">
+            <a:pPr marL="432000" indent="-323640">
+              <a:lnSpc>
+                <a:spcPct val="100000"/>
+              </a:lnSpc>
               <a:spcAft>
                 <a:spcPts val="1148"/>
               </a:spcAft>
@@ -2634,6 +4238,9 @@
             </a:pPr>
             <a:r>
               <a:rPr b="0" lang="en-IN" sz="2600" spc="-1" strike="noStrike">
+                <a:solidFill>
+                  <a:srgbClr val="0000ff"/>
+                </a:solidFill>
                 <a:latin typeface="Arial"/>
               </a:rPr>
               <a:t>How to prevent?</a:t>
@@ -2643,7 +4250,10 @@
             </a:endParaRPr>
           </a:p>
           <a:p>
-            <a:pPr lvl="1" marL="864000" indent="-324000">
+            <a:pPr lvl="1" marL="864000" indent="-323640">
+              <a:lnSpc>
+                <a:spcPct val="100000"/>
+              </a:lnSpc>
               <a:spcAft>
                 <a:spcPts val="918"/>
               </a:spcAft>
@@ -2651,11 +4261,14 @@
                 <a:srgbClr val="000000"/>
               </a:buClr>
               <a:buSzPct val="75000"/>
-              <a:buFont typeface="Symbol" charset="2"/>
+              <a:buFont typeface="Symbol"/>
               <a:buChar char=""/>
             </a:pPr>
             <a:r>
               <a:rPr b="0" lang="en-IN" sz="2280" spc="-1" strike="noStrike">
+                <a:solidFill>
+                  <a:srgbClr val="0000ff"/>
+                </a:solidFill>
                 <a:latin typeface="Arial"/>
               </a:rPr>
               <a:t>SAST tool might help</a:t>
@@ -2665,7 +4278,10 @@
             </a:endParaRPr>
           </a:p>
           <a:p>
-            <a:pPr lvl="1" marL="864000" indent="-324000">
+            <a:pPr lvl="1" marL="864000" indent="-323640">
+              <a:lnSpc>
+                <a:spcPct val="100000"/>
+              </a:lnSpc>
               <a:spcAft>
                 <a:spcPts val="918"/>
               </a:spcAft>
@@ -2673,11 +4289,14 @@
                 <a:srgbClr val="000000"/>
               </a:buClr>
               <a:buSzPct val="75000"/>
-              <a:buFont typeface="Symbol" charset="2"/>
+              <a:buFont typeface="Symbol"/>
               <a:buChar char=""/>
             </a:pPr>
             <a:r>
               <a:rPr b="0" lang="en-IN" sz="2280" spc="-1" strike="noStrike">
+                <a:solidFill>
+                  <a:srgbClr val="0000ff"/>
+                </a:solidFill>
                 <a:latin typeface="Arial"/>
               </a:rPr>
               <a:t>Awareness about parser/DTD</a:t>
@@ -2739,14 +4358,14 @@
       </p:grpSpPr>
       <p:sp>
         <p:nvSpPr>
-          <p:cNvPr id="53" name="TextShape 1"/>
-          <p:cNvSpPr txBox="1"/>
+          <p:cNvPr id="89" name="CustomShape 1"/>
+          <p:cNvSpPr/>
           <p:nvPr/>
         </p:nvSpPr>
         <p:spPr>
           <a:xfrm>
             <a:off x="504000" y="216000"/>
-            <a:ext cx="7020000" cy="936000"/>
+            <a:ext cx="7019640" cy="935640"/>
           </a:xfrm>
           <a:prstGeom prst="rect">
             <a:avLst/>
@@ -2756,9 +4375,20 @@
             <a:noFill/>
           </a:ln>
         </p:spPr>
+        <p:style>
+          <a:lnRef idx="0"/>
+          <a:fillRef idx="0"/>
+          <a:effectRef idx="0"/>
+          <a:fontRef idx="minor"/>
+        </p:style>
         <p:txBody>
           <a:bodyPr lIns="0" rIns="0" tIns="0" bIns="0" anchor="ctr"/>
           <a:p>
+            <a:pPr>
+              <a:lnSpc>
+                <a:spcPct val="100000"/>
+              </a:lnSpc>
+            </a:pPr>
             <a:r>
               <a:rPr b="0" lang="en-IN" sz="3570" spc="-1" strike="noStrike">
                 <a:solidFill>
@@ -2769,9 +4399,6 @@
               <a:t>Zip Bomb Attack</a:t>
             </a:r>
             <a:endParaRPr b="0" lang="en-IN" sz="3570" spc="-1" strike="noStrike">
-              <a:solidFill>
-                <a:srgbClr val="ffffff"/>
-              </a:solidFill>
               <a:latin typeface="Arial"/>
             </a:endParaRPr>
           </a:p>
@@ -2779,7 +4406,7 @@
       </p:sp>
       <p:pic>
         <p:nvPicPr>
-          <p:cNvPr id="54" name="" descr=""/>
+          <p:cNvPr id="90" name="" descr=""/>
           <p:cNvPicPr/>
           <p:nvPr/>
         </p:nvPicPr>
@@ -2790,7 +4417,7 @@
         <p:spPr>
           <a:xfrm>
             <a:off x="1046880" y="1360080"/>
-            <a:ext cx="7914960" cy="4362120"/>
+            <a:ext cx="7914600" cy="4361760"/>
           </a:xfrm>
           <a:prstGeom prst="rect">
             <a:avLst/>
@@ -2851,14 +4478,14 @@
       </p:grpSpPr>
       <p:sp>
         <p:nvSpPr>
-          <p:cNvPr id="55" name="TextShape 1"/>
-          <p:cNvSpPr txBox="1"/>
+          <p:cNvPr id="91" name="CustomShape 1"/>
+          <p:cNvSpPr/>
           <p:nvPr/>
         </p:nvSpPr>
         <p:spPr>
           <a:xfrm>
             <a:off x="504000" y="216000"/>
-            <a:ext cx="7020000" cy="936000"/>
+            <a:ext cx="7019640" cy="935640"/>
           </a:xfrm>
           <a:prstGeom prst="rect">
             <a:avLst/>
@@ -2868,9 +4495,20 @@
             <a:noFill/>
           </a:ln>
         </p:spPr>
+        <p:style>
+          <a:lnRef idx="0"/>
+          <a:fillRef idx="0"/>
+          <a:effectRef idx="0"/>
+          <a:fontRef idx="minor"/>
+        </p:style>
         <p:txBody>
           <a:bodyPr lIns="0" rIns="0" tIns="0" bIns="0" anchor="ctr"/>
           <a:p>
+            <a:pPr>
+              <a:lnSpc>
+                <a:spcPct val="100000"/>
+              </a:lnSpc>
+            </a:pPr>
             <a:r>
               <a:rPr b="0" lang="en-IN" sz="3570" spc="-1" strike="noStrike">
                 <a:solidFill>
@@ -2881,24 +4519,21 @@
               <a:t>Security Misconfiguration</a:t>
             </a:r>
             <a:endParaRPr b="0" lang="en-IN" sz="3570" spc="-1" strike="noStrike">
-              <a:solidFill>
-                <a:srgbClr val="ffffff"/>
-              </a:solidFill>
-              <a:latin typeface="Arial"/>
-            </a:endParaRPr>
-          </a:p>
-        </p:txBody>
-      </p:sp>
-      <p:sp>
-        <p:nvSpPr>
-          <p:cNvPr id="56" name="TextShape 2"/>
-          <p:cNvSpPr txBox="1"/>
+              <a:latin typeface="Arial"/>
+            </a:endParaRPr>
+          </a:p>
+        </p:txBody>
+      </p:sp>
+      <p:sp>
+        <p:nvSpPr>
+          <p:cNvPr id="92" name="CustomShape 2"/>
+          <p:cNvSpPr/>
           <p:nvPr/>
         </p:nvSpPr>
         <p:spPr>
           <a:xfrm>
             <a:off x="504000" y="1368000"/>
-            <a:ext cx="9072000" cy="3288240"/>
+            <a:ext cx="9071640" cy="3287880"/>
           </a:xfrm>
           <a:prstGeom prst="rect">
             <a:avLst/>
@@ -2908,12 +4543,21 @@
             <a:noFill/>
           </a:ln>
         </p:spPr>
-        <p:txBody>
-          <a:bodyPr lIns="0" rIns="0" tIns="0" bIns="0">
-            <a:normAutofit/>
-          </a:bodyPr>
-          <a:p>
-            <a:pPr marL="432000" indent="-324000">
+        <p:style>
+          <a:lnRef idx="0"/>
+          <a:fillRef idx="0"/>
+          <a:effectRef idx="0"/>
+          <a:fontRef idx="minor"/>
+        </p:style>
+        <p:txBody>
+          <a:bodyPr lIns="0" rIns="0" tIns="0" bIns="0">
+            <a:normAutofit/>
+          </a:bodyPr>
+          <a:p>
+            <a:pPr marL="432000" indent="-323640">
+              <a:lnSpc>
+                <a:spcPct val="100000"/>
+              </a:lnSpc>
               <a:spcAft>
                 <a:spcPts val="1148"/>
               </a:spcAft>
@@ -2931,7 +4575,11 @@
               <a:t>Path traversal attack </a:t>
             </a:r>
             <a:r>
-              <a:rPr b="0" lang="en-IN" sz="2600" spc="-1" strike="noStrike">
+              <a:rPr b="0" lang="en-IN" sz="2600" spc="-1" strike="noStrike" u="sng">
+                <a:solidFill>
+                  <a:srgbClr val="0000ff"/>
+                </a:solidFill>
+                <a:uFillTx/>
                 <a:latin typeface="Arial"/>
                 <a:hlinkClick r:id="rId1"/>
               </a:rPr>
@@ -2942,7 +4590,10 @@
             </a:endParaRPr>
           </a:p>
           <a:p>
-            <a:pPr marL="432000" indent="-324000">
+            <a:pPr marL="432000" indent="-323640">
+              <a:lnSpc>
+                <a:spcPct val="100000"/>
+              </a:lnSpc>
               <a:spcAft>
                 <a:spcPts val="1148"/>
               </a:spcAft>
@@ -2955,12 +4606,19 @@
             </a:pPr>
             <a:r>
               <a:rPr b="0" lang="en-IN" sz="2600" spc="-1" strike="noStrike">
+                <a:solidFill>
+                  <a:srgbClr val="0000ff"/>
+                </a:solidFill>
                 <a:latin typeface="Arial"/>
               </a:rPr>
               <a:t>AWS demo: </a:t>
             </a:r>
             <a:r>
-              <a:rPr b="0" lang="en-IN" sz="2600" spc="-1" strike="noStrike">
+              <a:rPr b="0" lang="en-IN" sz="2600" spc="-1" strike="noStrike" u="sng">
+                <a:solidFill>
+                  <a:srgbClr val="0000ff"/>
+                </a:solidFill>
+                <a:uFillTx/>
                 <a:latin typeface="Arial"/>
                 <a:hlinkClick r:id="rId2"/>
               </a:rPr>
@@ -2971,7 +4629,10 @@
             </a:endParaRPr>
           </a:p>
           <a:p>
-            <a:pPr marL="432000" indent="-324000">
+            <a:pPr marL="432000" indent="-323640">
+              <a:lnSpc>
+                <a:spcPct val="100000"/>
+              </a:lnSpc>
               <a:spcAft>
                 <a:spcPts val="1148"/>
               </a:spcAft>
@@ -2984,6 +4645,9 @@
             </a:pPr>
             <a:r>
               <a:rPr b="0" lang="en-IN" sz="2600" spc="-1" strike="noStrike">
+                <a:solidFill>
+                  <a:srgbClr val="0000ff"/>
+                </a:solidFill>
                 <a:latin typeface="Arial"/>
               </a:rPr>
               <a:t>Lessons?</a:t>
@@ -2993,7 +4657,10 @@
             </a:endParaRPr>
           </a:p>
           <a:p>
-            <a:pPr lvl="1" marL="864000" indent="-324000">
+            <a:pPr lvl="1" marL="864000" indent="-323640">
+              <a:lnSpc>
+                <a:spcPct val="100000"/>
+              </a:lnSpc>
               <a:spcAft>
                 <a:spcPts val="918"/>
               </a:spcAft>
@@ -3001,11 +4668,14 @@
                 <a:srgbClr val="000000"/>
               </a:buClr>
               <a:buSzPct val="75000"/>
-              <a:buFont typeface="Symbol" charset="2"/>
+              <a:buFont typeface="Symbol"/>
               <a:buChar char=""/>
             </a:pPr>
             <a:r>
               <a:rPr b="0" lang="en-IN" sz="2280" spc="-1" strike="noStrike">
+                <a:solidFill>
+                  <a:srgbClr val="0000ff"/>
+                </a:solidFill>
                 <a:latin typeface="Arial"/>
               </a:rPr>
               <a:t>Information disclosure</a:t>
@@ -3015,7 +4685,10 @@
             </a:endParaRPr>
           </a:p>
           <a:p>
-            <a:pPr lvl="1" marL="864000" indent="-324000">
+            <a:pPr lvl="1" marL="864000" indent="-323640">
+              <a:lnSpc>
+                <a:spcPct val="100000"/>
+              </a:lnSpc>
               <a:spcAft>
                 <a:spcPts val="918"/>
               </a:spcAft>
@@ -3023,11 +4696,14 @@
                 <a:srgbClr val="000000"/>
               </a:buClr>
               <a:buSzPct val="75000"/>
-              <a:buFont typeface="Symbol" charset="2"/>
+              <a:buFont typeface="Symbol"/>
               <a:buChar char=""/>
             </a:pPr>
             <a:r>
               <a:rPr b="0" lang="en-IN" sz="2280" spc="-1" strike="noStrike">
+                <a:solidFill>
+                  <a:srgbClr val="0000ff"/>
+                </a:solidFill>
                 <a:latin typeface="Arial"/>
               </a:rPr>
               <a:t>DoS</a:t>
@@ -3037,7 +4713,10 @@
             </a:endParaRPr>
           </a:p>
           <a:p>
-            <a:pPr lvl="1" marL="864000" indent="-324000">
+            <a:pPr lvl="1" marL="864000" indent="-323640">
+              <a:lnSpc>
+                <a:spcPct val="100000"/>
+              </a:lnSpc>
               <a:spcAft>
                 <a:spcPts val="918"/>
               </a:spcAft>
@@ -3045,11 +4724,14 @@
                 <a:srgbClr val="000000"/>
               </a:buClr>
               <a:buSzPct val="75000"/>
-              <a:buFont typeface="Symbol" charset="2"/>
+              <a:buFont typeface="Symbol"/>
               <a:buChar char=""/>
             </a:pPr>
             <a:r>
               <a:rPr b="0" lang="en-IN" sz="2280" spc="-1" strike="noStrike">
+                <a:solidFill>
+                  <a:srgbClr val="0000ff"/>
+                </a:solidFill>
                 <a:latin typeface="Arial"/>
               </a:rPr>
               <a:t>Reputation loss etc</a:t>
@@ -3313,4 +4995,227 @@
     </a:fmtScheme>
   </a:themeElements>
 </a:theme>
+</file>
+
+<file path=ppt/theme/theme2.xml><?xml version="1.0" encoding="utf-8"?>
+<a:theme xmlns:a="http://schemas.openxmlformats.org/drawingml/2006/main" name="Office Theme">
+  <a:themeElements>
+    <a:clrScheme name="Office">
+      <a:dk1>
+        <a:sysClr val="windowText" lastClr="000000"/>
+      </a:dk1>
+      <a:lt1>
+        <a:sysClr val="window" lastClr="FFFFFF"/>
+      </a:lt1>
+      <a:dk2>
+        <a:srgbClr val="1f497d"/>
+      </a:dk2>
+      <a:lt2>
+        <a:srgbClr val="eeece1"/>
+      </a:lt2>
+      <a:accent1>
+        <a:srgbClr val="4f81bd"/>
+      </a:accent1>
+      <a:accent2>
+        <a:srgbClr val="c0504d"/>
+      </a:accent2>
+      <a:accent3>
+        <a:srgbClr val="9bbb59"/>
+      </a:accent3>
+      <a:accent4>
+        <a:srgbClr val="8064a2"/>
+      </a:accent4>
+      <a:accent5>
+        <a:srgbClr val="4bacc6"/>
+      </a:accent5>
+      <a:accent6>
+        <a:srgbClr val="f79646"/>
+      </a:accent6>
+      <a:hlink>
+        <a:srgbClr val="0000ff"/>
+      </a:hlink>
+      <a:folHlink>
+        <a:srgbClr val="800080"/>
+      </a:folHlink>
+    </a:clrScheme>
+    <a:fontScheme name="Office">
+      <a:majorFont>
+        <a:latin typeface="Arial"/>
+        <a:ea typeface="DejaVu Sans"/>
+        <a:cs typeface="DejaVu Sans"/>
+      </a:majorFont>
+      <a:minorFont>
+        <a:latin typeface="Arial"/>
+        <a:ea typeface="DejaVu Sans"/>
+        <a:cs typeface="DejaVu Sans"/>
+      </a:minorFont>
+    </a:fontScheme>
+    <a:fmtScheme name="Office">
+      <a:fillStyleLst>
+        <a:solidFill>
+          <a:schemeClr val="phClr"/>
+        </a:solidFill>
+        <a:gradFill rotWithShape="1">
+          <a:gsLst>
+            <a:gs pos="0">
+              <a:schemeClr val="phClr">
+                <a:tint val="50000"/>
+                <a:satMod val="300000"/>
+              </a:schemeClr>
+            </a:gs>
+            <a:gs pos="35000">
+              <a:schemeClr val="phClr">
+                <a:tint val="37000"/>
+                <a:satMod val="300000"/>
+              </a:schemeClr>
+            </a:gs>
+            <a:gs pos="100000">
+              <a:schemeClr val="phClr">
+                <a:tint val="15000"/>
+                <a:satMod val="350000"/>
+              </a:schemeClr>
+            </a:gs>
+          </a:gsLst>
+          <a:lin ang="16200000" scaled="1"/>
+        </a:gradFill>
+        <a:gradFill rotWithShape="1">
+          <a:gsLst>
+            <a:gs pos="0">
+              <a:schemeClr val="phClr">
+                <a:shade val="51000"/>
+                <a:satMod val="130000"/>
+              </a:schemeClr>
+            </a:gs>
+            <a:gs pos="80000">
+              <a:schemeClr val="phClr">
+                <a:shade val="93000"/>
+                <a:satMod val="130000"/>
+              </a:schemeClr>
+            </a:gs>
+            <a:gs pos="100000">
+              <a:schemeClr val="phClr">
+                <a:shade val="94000"/>
+                <a:satMod val="135000"/>
+              </a:schemeClr>
+            </a:gs>
+          </a:gsLst>
+          <a:lin ang="16200000" scaled="0"/>
+        </a:gradFill>
+      </a:fillStyleLst>
+      <a:lnStyleLst>
+        <a:ln w="9525" cap="flat" cmpd="sng" algn="ctr">
+          <a:solidFill>
+            <a:schemeClr val="phClr">
+              <a:shade val="95000"/>
+              <a:satMod val="105000"/>
+            </a:schemeClr>
+          </a:solidFill>
+          <a:prstDash val="solid"/>
+        </a:ln>
+        <a:ln w="25400" cap="flat" cmpd="sng" algn="ctr">
+          <a:solidFill>
+            <a:schemeClr val="phClr"/>
+          </a:solidFill>
+          <a:prstDash val="solid"/>
+        </a:ln>
+        <a:ln w="38100" cap="flat" cmpd="sng" algn="ctr">
+          <a:solidFill>
+            <a:schemeClr val="phClr"/>
+          </a:solidFill>
+          <a:prstDash val="solid"/>
+        </a:ln>
+      </a:lnStyleLst>
+      <a:effectStyleLst>
+        <a:effectStyle>
+          <a:effectLst>
+            <a:outerShdw blurRad="40000" dist="20000" dir="5400000" rotWithShape="0">
+              <a:srgbClr val="000000">
+                <a:alpha val="38000"/>
+              </a:srgbClr>
+            </a:outerShdw>
+          </a:effectLst>
+        </a:effectStyle>
+        <a:effectStyle>
+          <a:effectLst>
+            <a:outerShdw blurRad="40000" dist="23000" dir="5400000" rotWithShape="0">
+              <a:srgbClr val="000000">
+                <a:alpha val="35000"/>
+              </a:srgbClr>
+            </a:outerShdw>
+          </a:effectLst>
+        </a:effectStyle>
+        <a:effectStyle>
+          <a:effectLst>
+            <a:outerShdw blurRad="40000" dist="23000" dir="5400000" rotWithShape="0">
+              <a:srgbClr val="000000">
+                <a:alpha val="35000"/>
+              </a:srgbClr>
+            </a:outerShdw>
+          </a:effectLst>
+          <a:scene3d>
+            <a:camera prst="orthographicFront">
+              <a:rot lat="0" lon="0" rev="0"/>
+            </a:camera>
+            <a:lightRig rig="threePt" dir="t">
+              <a:rot lat="0" lon="0" rev="1200000"/>
+            </a:lightRig>
+          </a:scene3d>
+          <a:sp3d>
+            <a:bevelT w="63500" h="25400"/>
+          </a:sp3d>
+        </a:effectStyle>
+      </a:effectStyleLst>
+      <a:bgFillStyleLst>
+        <a:solidFill>
+          <a:schemeClr val="phClr"/>
+        </a:solidFill>
+        <a:gradFill rotWithShape="1">
+          <a:gsLst>
+            <a:gs pos="0">
+              <a:schemeClr val="phClr">
+                <a:tint val="40000"/>
+                <a:satMod val="350000"/>
+              </a:schemeClr>
+            </a:gs>
+            <a:gs pos="40000">
+              <a:schemeClr val="phClr">
+                <a:tint val="45000"/>
+                <a:shade val="99000"/>
+                <a:satMod val="350000"/>
+              </a:schemeClr>
+            </a:gs>
+            <a:gs pos="100000">
+              <a:schemeClr val="phClr">
+                <a:shade val="20000"/>
+                <a:satMod val="255000"/>
+              </a:schemeClr>
+            </a:gs>
+          </a:gsLst>
+          <a:path path="circle">
+            <a:fillToRect l="50000" t="-80000" r="50000" b="180000"/>
+          </a:path>
+        </a:gradFill>
+        <a:gradFill rotWithShape="1">
+          <a:gsLst>
+            <a:gs pos="0">
+              <a:schemeClr val="phClr">
+                <a:tint val="80000"/>
+                <a:satMod val="300000"/>
+              </a:schemeClr>
+            </a:gs>
+            <a:gs pos="100000">
+              <a:schemeClr val="phClr">
+                <a:shade val="30000"/>
+                <a:satMod val="200000"/>
+              </a:schemeClr>
+            </a:gs>
+          </a:gsLst>
+          <a:path path="circle">
+            <a:fillToRect l="50000" t="50000" r="50000" b="50000"/>
+          </a:path>
+        </a:gradFill>
+      </a:bgFillStyleLst>
+    </a:fmtScheme>
+  </a:themeElements>
+</a:theme>
 </file>
</xml_diff>